<commit_message>
lab work done, presentation work for pps
</commit_message>
<xml_diff>
--- a/physics_problem_solving/supernova_cosmology_jacky_cao.pptx
+++ b/physics_problem_solving/supernova_cosmology_jacky_cao.pptx
@@ -5,11 +5,12 @@
     <p:sldMasterId id="2147483648" r:id="rId1"/>
   </p:sldMasterIdLst>
   <p:notesMasterIdLst>
-    <p:notesMasterId r:id="rId4"/>
+    <p:notesMasterId r:id="rId5"/>
   </p:notesMasterIdLst>
   <p:sldIdLst>
     <p:sldId id="256" r:id="rId2"/>
     <p:sldId id="257" r:id="rId3"/>
+    <p:sldId id="258" r:id="rId4"/>
   </p:sldIdLst>
   <p:sldSz cx="12192000" cy="6858000"/>
   <p:notesSz cx="6858000" cy="9144000"/>
@@ -108,6 +109,11 @@
       </a:defRPr>
     </a:lvl9pPr>
   </p:defaultTextStyle>
+  <p:extLst>
+    <p:ext uri="{EFAFB233-063F-42B5-8137-9DF3F51BA10A}">
+      <p15:sldGuideLst xmlns:p15="http://schemas.microsoft.com/office/powerpoint/2012/main"/>
+    </p:ext>
+  </p:extLst>
 </p:presentation>
 </file>
 
@@ -193,7 +199,7 @@
           <a:p>
             <a:fld id="{46D69DF3-6E17-9A40-B1C9-2C7C23E56BFA}" type="datetimeFigureOut">
               <a:rPr lang="en-GB" smtClean="0"/>
-              <a:t>06/11/2017</a:t>
+              <a:t>15/11/2017</a:t>
             </a:fld>
             <a:endParaRPr lang="en-GB"/>
           </a:p>
@@ -776,7 +782,7 @@
           <a:p>
             <a:fld id="{56887D90-663E-4645-B9F0-D58A2107F2CC}" type="datetimeFigureOut">
               <a:rPr lang="en-GB" smtClean="0"/>
-              <a:t>06/11/2017</a:t>
+              <a:t>15/11/2017</a:t>
             </a:fld>
             <a:endParaRPr lang="en-GB"/>
           </a:p>
@@ -946,7 +952,7 @@
           <a:p>
             <a:fld id="{56887D90-663E-4645-B9F0-D58A2107F2CC}" type="datetimeFigureOut">
               <a:rPr lang="en-GB" smtClean="0"/>
-              <a:t>06/11/2017</a:t>
+              <a:t>15/11/2017</a:t>
             </a:fld>
             <a:endParaRPr lang="en-GB"/>
           </a:p>
@@ -1126,7 +1132,7 @@
           <a:p>
             <a:fld id="{56887D90-663E-4645-B9F0-D58A2107F2CC}" type="datetimeFigureOut">
               <a:rPr lang="en-GB" smtClean="0"/>
-              <a:t>06/11/2017</a:t>
+              <a:t>15/11/2017</a:t>
             </a:fld>
             <a:endParaRPr lang="en-GB"/>
           </a:p>
@@ -1296,7 +1302,7 @@
           <a:p>
             <a:fld id="{56887D90-663E-4645-B9F0-D58A2107F2CC}" type="datetimeFigureOut">
               <a:rPr lang="en-GB" smtClean="0"/>
-              <a:t>06/11/2017</a:t>
+              <a:t>15/11/2017</a:t>
             </a:fld>
             <a:endParaRPr lang="en-GB"/>
           </a:p>
@@ -1542,7 +1548,7 @@
           <a:p>
             <a:fld id="{56887D90-663E-4645-B9F0-D58A2107F2CC}" type="datetimeFigureOut">
               <a:rPr lang="en-GB" smtClean="0"/>
-              <a:t>06/11/2017</a:t>
+              <a:t>15/11/2017</a:t>
             </a:fld>
             <a:endParaRPr lang="en-GB"/>
           </a:p>
@@ -1774,7 +1780,7 @@
           <a:p>
             <a:fld id="{56887D90-663E-4645-B9F0-D58A2107F2CC}" type="datetimeFigureOut">
               <a:rPr lang="en-GB" smtClean="0"/>
-              <a:t>06/11/2017</a:t>
+              <a:t>15/11/2017</a:t>
             </a:fld>
             <a:endParaRPr lang="en-GB"/>
           </a:p>
@@ -2141,7 +2147,7 @@
           <a:p>
             <a:fld id="{56887D90-663E-4645-B9F0-D58A2107F2CC}" type="datetimeFigureOut">
               <a:rPr lang="en-GB" smtClean="0"/>
-              <a:t>06/11/2017</a:t>
+              <a:t>15/11/2017</a:t>
             </a:fld>
             <a:endParaRPr lang="en-GB"/>
           </a:p>
@@ -2259,7 +2265,7 @@
           <a:p>
             <a:fld id="{56887D90-663E-4645-B9F0-D58A2107F2CC}" type="datetimeFigureOut">
               <a:rPr lang="en-GB" smtClean="0"/>
-              <a:t>06/11/2017</a:t>
+              <a:t>15/11/2017</a:t>
             </a:fld>
             <a:endParaRPr lang="en-GB"/>
           </a:p>
@@ -2354,7 +2360,7 @@
           <a:p>
             <a:fld id="{56887D90-663E-4645-B9F0-D58A2107F2CC}" type="datetimeFigureOut">
               <a:rPr lang="en-GB" smtClean="0"/>
-              <a:t>06/11/2017</a:t>
+              <a:t>15/11/2017</a:t>
             </a:fld>
             <a:endParaRPr lang="en-GB"/>
           </a:p>
@@ -2631,7 +2637,7 @@
           <a:p>
             <a:fld id="{56887D90-663E-4645-B9F0-D58A2107F2CC}" type="datetimeFigureOut">
               <a:rPr lang="en-GB" smtClean="0"/>
-              <a:t>06/11/2017</a:t>
+              <a:t>15/11/2017</a:t>
             </a:fld>
             <a:endParaRPr lang="en-GB"/>
           </a:p>
@@ -2884,7 +2890,7 @@
           <a:p>
             <a:fld id="{56887D90-663E-4645-B9F0-D58A2107F2CC}" type="datetimeFigureOut">
               <a:rPr lang="en-GB" smtClean="0"/>
-              <a:t>06/11/2017</a:t>
+              <a:t>15/11/2017</a:t>
             </a:fld>
             <a:endParaRPr lang="en-GB"/>
           </a:p>
@@ -3097,7 +3103,7 @@
           <a:p>
             <a:fld id="{56887D90-663E-4645-B9F0-D58A2107F2CC}" type="datetimeFigureOut">
               <a:rPr lang="en-GB" smtClean="0"/>
-              <a:t>06/11/2017</a:t>
+              <a:t>15/11/2017</a:t>
             </a:fld>
             <a:endParaRPr lang="en-GB"/>
           </a:p>
@@ -3518,10 +3524,18 @@
           <a:lstStyle/>
           <a:p>
             <a:r>
-              <a:rPr lang="en-GB" dirty="0" smtClean="0"/>
+              <a:rPr lang="en-GB" dirty="0" smtClean="0">
+                <a:latin typeface="Cambria Math" charset="0"/>
+                <a:ea typeface="Cambria Math" charset="0"/>
+                <a:cs typeface="Cambria Math" charset="0"/>
+              </a:rPr>
               <a:t>Supernova Cosmology</a:t>
             </a:r>
-            <a:endParaRPr lang="en-GB" dirty="0"/>
+            <a:endParaRPr lang="en-GB" dirty="0">
+              <a:latin typeface="Cambria Math" charset="0"/>
+              <a:ea typeface="Cambria Math" charset="0"/>
+              <a:cs typeface="Cambria Math" charset="0"/>
+            </a:endParaRPr>
           </a:p>
         </p:txBody>
       </p:sp>
@@ -3541,10 +3555,18 @@
           <a:lstStyle/>
           <a:p>
             <a:r>
-              <a:rPr lang="en-GB" dirty="0" smtClean="0"/>
+              <a:rPr lang="en-GB" dirty="0" smtClean="0">
+                <a:latin typeface="Cambria Math" charset="0"/>
+                <a:ea typeface="Cambria Math" charset="0"/>
+                <a:cs typeface="Cambria Math" charset="0"/>
+              </a:rPr>
               <a:t>Jacky Cao</a:t>
             </a:r>
-            <a:endParaRPr lang="en-GB" dirty="0"/>
+            <a:endParaRPr lang="en-GB" dirty="0">
+              <a:latin typeface="Cambria Math" charset="0"/>
+              <a:ea typeface="Cambria Math" charset="0"/>
+              <a:cs typeface="Cambria Math" charset="0"/>
+            </a:endParaRPr>
           </a:p>
         </p:txBody>
       </p:sp>
@@ -3594,10 +3616,18 @@
           <a:lstStyle/>
           <a:p>
             <a:r>
-              <a:rPr lang="en-GB" dirty="0" smtClean="0"/>
+              <a:rPr lang="en-GB" dirty="0" smtClean="0">
+                <a:latin typeface="Cambria Math" charset="0"/>
+                <a:ea typeface="Cambria Math" charset="0"/>
+                <a:cs typeface="Cambria Math" charset="0"/>
+              </a:rPr>
               <a:t>Summary</a:t>
             </a:r>
-            <a:endParaRPr lang="en-GB" dirty="0"/>
+            <a:endParaRPr lang="en-GB" dirty="0">
+              <a:latin typeface="Cambria Math" charset="0"/>
+              <a:ea typeface="Cambria Math" charset="0"/>
+              <a:cs typeface="Cambria Math" charset="0"/>
+            </a:endParaRPr>
           </a:p>
         </p:txBody>
       </p:sp>
@@ -3616,7 +3646,19 @@
           <a:bodyPr/>
           <a:lstStyle/>
           <a:p>
-            <a:endParaRPr lang="en-GB"/>
+            <a:r>
+              <a:rPr lang="en-GB" dirty="0" smtClean="0">
+                <a:latin typeface="Cambria Math" charset="0"/>
+                <a:ea typeface="Cambria Math" charset="0"/>
+                <a:cs typeface="Cambria Math" charset="0"/>
+              </a:rPr>
+              <a:t>Supernovae: an overview</a:t>
+            </a:r>
+            <a:endParaRPr lang="en-GB" dirty="0">
+              <a:latin typeface="Cambria Math" charset="0"/>
+              <a:ea typeface="Cambria Math" charset="0"/>
+              <a:cs typeface="Cambria Math" charset="0"/>
+            </a:endParaRPr>
           </a:p>
         </p:txBody>
       </p:sp>
@@ -3624,6 +3666,175 @@
     <p:extLst>
       <p:ext uri="{BB962C8B-B14F-4D97-AF65-F5344CB8AC3E}">
         <p14:creationId xmlns:p14="http://schemas.microsoft.com/office/powerpoint/2010/main" val="1335158702"/>
+      </p:ext>
+    </p:extLst>
+  </p:cSld>
+  <p:clrMapOvr>
+    <a:masterClrMapping/>
+  </p:clrMapOvr>
+</p:sld>
+</file>
+
+<file path=ppt/slides/slide3.xml><?xml version="1.0" encoding="utf-8"?>
+<p:sld xmlns:a="http://schemas.openxmlformats.org/drawingml/2006/main" xmlns:r="http://schemas.openxmlformats.org/officeDocument/2006/relationships" xmlns:p="http://schemas.openxmlformats.org/presentationml/2006/main">
+  <p:cSld>
+    <p:spTree>
+      <p:nvGrpSpPr>
+        <p:cNvPr id="1" name=""/>
+        <p:cNvGrpSpPr/>
+        <p:nvPr/>
+      </p:nvGrpSpPr>
+      <p:grpSpPr>
+        <a:xfrm>
+          <a:off x="0" y="0"/>
+          <a:ext cx="0" cy="0"/>
+          <a:chOff x="0" y="0"/>
+          <a:chExt cx="0" cy="0"/>
+        </a:xfrm>
+      </p:grpSpPr>
+      <p:sp>
+        <p:nvSpPr>
+          <p:cNvPr id="2" name="Title 1"/>
+          <p:cNvSpPr>
+            <a:spLocks noGrp="1"/>
+          </p:cNvSpPr>
+          <p:nvPr>
+            <p:ph type="title"/>
+          </p:nvPr>
+        </p:nvSpPr>
+        <p:spPr/>
+        <p:txBody>
+          <a:bodyPr/>
+          <a:lstStyle/>
+          <a:p>
+            <a:r>
+              <a:rPr lang="en-GB" dirty="0" smtClean="0">
+                <a:latin typeface="Cambria Math" charset="0"/>
+                <a:ea typeface="Cambria Math" charset="0"/>
+                <a:cs typeface="Cambria Math" charset="0"/>
+              </a:rPr>
+              <a:t>Supernovae</a:t>
+            </a:r>
+            <a:endParaRPr lang="en-GB" dirty="0">
+              <a:latin typeface="Cambria Math" charset="0"/>
+              <a:ea typeface="Cambria Math" charset="0"/>
+              <a:cs typeface="Cambria Math" charset="0"/>
+            </a:endParaRPr>
+          </a:p>
+        </p:txBody>
+      </p:sp>
+      <p:sp>
+        <p:nvSpPr>
+          <p:cNvPr id="3" name="Content Placeholder 2"/>
+          <p:cNvSpPr>
+            <a:spLocks noGrp="1"/>
+          </p:cNvSpPr>
+          <p:nvPr>
+            <p:ph idx="1"/>
+          </p:nvPr>
+        </p:nvSpPr>
+        <p:spPr/>
+        <p:txBody>
+          <a:bodyPr/>
+          <a:lstStyle/>
+          <a:p>
+            <a:r>
+              <a:rPr lang="en-GB" dirty="0" smtClean="0">
+                <a:latin typeface="Cambria Math" charset="0"/>
+                <a:ea typeface="Cambria Math" charset="0"/>
+                <a:cs typeface="Cambria Math" charset="0"/>
+              </a:rPr>
+              <a:t>Type I</a:t>
+            </a:r>
+          </a:p>
+          <a:p>
+            <a:pPr lvl="1"/>
+            <a:r>
+              <a:rPr lang="en-GB" dirty="0" smtClean="0">
+                <a:latin typeface="Cambria Math" charset="0"/>
+                <a:ea typeface="Cambria Math" charset="0"/>
+                <a:cs typeface="Cambria Math" charset="0"/>
+              </a:rPr>
+              <a:t>Binary system with a white dwarf and a donor star</a:t>
+            </a:r>
+          </a:p>
+          <a:p>
+            <a:pPr lvl="1"/>
+            <a:r>
+              <a:rPr lang="en-GB" dirty="0" smtClean="0">
+                <a:latin typeface="Cambria Math" charset="0"/>
+                <a:ea typeface="Cambria Math" charset="0"/>
+                <a:cs typeface="Cambria Math" charset="0"/>
+              </a:rPr>
+              <a:t>An absence of the hydrogen in it’s spectrum</a:t>
+            </a:r>
+            <a:endParaRPr lang="en-GB" dirty="0">
+              <a:latin typeface="Cambria Math" charset="0"/>
+              <a:ea typeface="Cambria Math" charset="0"/>
+              <a:cs typeface="Cambria Math" charset="0"/>
+            </a:endParaRPr>
+          </a:p>
+          <a:p>
+            <a:r>
+              <a:rPr lang="en-GB" dirty="0" smtClean="0">
+                <a:latin typeface="Cambria Math" charset="0"/>
+                <a:ea typeface="Cambria Math" charset="0"/>
+                <a:cs typeface="Cambria Math" charset="0"/>
+              </a:rPr>
+              <a:t>Type II</a:t>
+            </a:r>
+          </a:p>
+          <a:p>
+            <a:pPr lvl="1"/>
+            <a:r>
+              <a:rPr lang="en-GB" dirty="0" smtClean="0">
+                <a:latin typeface="Cambria Math" charset="0"/>
+                <a:ea typeface="Cambria Math" charset="0"/>
+                <a:cs typeface="Cambria Math" charset="0"/>
+              </a:rPr>
+              <a:t>A massive star which has reached the Chandrasekhar Limit </a:t>
+            </a:r>
+          </a:p>
+          <a:p>
+            <a:pPr lvl="1"/>
+            <a:r>
+              <a:rPr lang="en-GB" dirty="0" smtClean="0">
+                <a:latin typeface="Cambria Math" charset="0"/>
+                <a:ea typeface="Cambria Math" charset="0"/>
+                <a:cs typeface="Cambria Math" charset="0"/>
+              </a:rPr>
+              <a:t>Features the hydrogen feature</a:t>
+            </a:r>
+            <a:endParaRPr lang="en-GB" dirty="0">
+              <a:latin typeface="Cambria Math" charset="0"/>
+              <a:ea typeface="Cambria Math" charset="0"/>
+              <a:cs typeface="Cambria Math" charset="0"/>
+            </a:endParaRPr>
+          </a:p>
+          <a:p>
+            <a:pPr lvl="1"/>
+            <a:endParaRPr lang="en-GB" dirty="0" smtClean="0">
+              <a:latin typeface="Cambria Math" charset="0"/>
+              <a:ea typeface="Cambria Math" charset="0"/>
+              <a:cs typeface="Cambria Math" charset="0"/>
+            </a:endParaRPr>
+          </a:p>
+          <a:p>
+            <a:r>
+              <a:rPr lang="en-GB" dirty="0" smtClean="0">
+                <a:latin typeface="Cambria Math" charset="0"/>
+                <a:ea typeface="Cambria Math" charset="0"/>
+                <a:cs typeface="Cambria Math" charset="0"/>
+              </a:rPr>
+              <a:t>More sub-classifications within Type I and Type II </a:t>
+            </a:r>
+          </a:p>
+        </p:txBody>
+      </p:sp>
+    </p:spTree>
+    <p:extLst>
+      <p:ext uri="{BB962C8B-B14F-4D97-AF65-F5344CB8AC3E}">
+        <p14:creationId xmlns:p14="http://schemas.microsoft.com/office/powerpoint/2010/main" val="707778237"/>
       </p:ext>
     </p:extLst>
   </p:cSld>

</xml_diff>

<commit_message>
back-up before another unit removal
woo!
</commit_message>
<xml_diff>
--- a/physics_problem_solving/supernova_cosmology_jacky_cao.pptx
+++ b/physics_problem_solving/supernova_cosmology_jacky_cao.pptx
@@ -5,12 +5,13 @@
     <p:sldMasterId id="2147483648" r:id="rId1"/>
   </p:sldMasterIdLst>
   <p:notesMasterIdLst>
-    <p:notesMasterId r:id="rId5"/>
+    <p:notesMasterId r:id="rId6"/>
   </p:notesMasterIdLst>
   <p:sldIdLst>
     <p:sldId id="256" r:id="rId2"/>
     <p:sldId id="257" r:id="rId3"/>
     <p:sldId id="258" r:id="rId4"/>
+    <p:sldId id="259" r:id="rId5"/>
   </p:sldIdLst>
   <p:sldSz cx="12192000" cy="6858000"/>
   <p:notesSz cx="6858000" cy="9144000"/>
@@ -3835,6 +3836,106 @@
     <p:extLst>
       <p:ext uri="{BB962C8B-B14F-4D97-AF65-F5344CB8AC3E}">
         <p14:creationId xmlns:p14="http://schemas.microsoft.com/office/powerpoint/2010/main" val="707778237"/>
+      </p:ext>
+    </p:extLst>
+  </p:cSld>
+  <p:clrMapOvr>
+    <a:masterClrMapping/>
+  </p:clrMapOvr>
+</p:sld>
+</file>
+
+<file path=ppt/slides/slide4.xml><?xml version="1.0" encoding="utf-8"?>
+<p:sld xmlns:a="http://schemas.openxmlformats.org/drawingml/2006/main" xmlns:r="http://schemas.openxmlformats.org/officeDocument/2006/relationships" xmlns:p="http://schemas.openxmlformats.org/presentationml/2006/main">
+  <p:cSld>
+    <p:spTree>
+      <p:nvGrpSpPr>
+        <p:cNvPr id="1" name=""/>
+        <p:cNvGrpSpPr/>
+        <p:nvPr/>
+      </p:nvGrpSpPr>
+      <p:grpSpPr>
+        <a:xfrm>
+          <a:off x="0" y="0"/>
+          <a:ext cx="0" cy="0"/>
+          <a:chOff x="0" y="0"/>
+          <a:chExt cx="0" cy="0"/>
+        </a:xfrm>
+      </p:grpSpPr>
+      <p:sp>
+        <p:nvSpPr>
+          <p:cNvPr id="2" name="Title 1"/>
+          <p:cNvSpPr>
+            <a:spLocks noGrp="1"/>
+          </p:cNvSpPr>
+          <p:nvPr>
+            <p:ph type="title"/>
+          </p:nvPr>
+        </p:nvSpPr>
+        <p:spPr/>
+        <p:txBody>
+          <a:bodyPr/>
+          <a:lstStyle/>
+          <a:p>
+            <a:r>
+              <a:rPr lang="en-GB" dirty="0" smtClean="0">
+                <a:latin typeface="Cambria Math" charset="0"/>
+                <a:ea typeface="Cambria Math" charset="0"/>
+                <a:cs typeface="Cambria Math" charset="0"/>
+              </a:rPr>
+              <a:t>Type </a:t>
+            </a:r>
+            <a:r>
+              <a:rPr lang="en-GB" dirty="0" err="1" smtClean="0">
+                <a:latin typeface="Cambria Math" charset="0"/>
+                <a:ea typeface="Cambria Math" charset="0"/>
+                <a:cs typeface="Cambria Math" charset="0"/>
+              </a:rPr>
+              <a:t>Ia</a:t>
+            </a:r>
+            <a:r>
+              <a:rPr lang="en-GB" dirty="0" smtClean="0">
+                <a:latin typeface="Cambria Math" charset="0"/>
+                <a:ea typeface="Cambria Math" charset="0"/>
+                <a:cs typeface="Cambria Math" charset="0"/>
+              </a:rPr>
+              <a:t> Supernovae</a:t>
+            </a:r>
+            <a:endParaRPr lang="en-GB" dirty="0">
+              <a:latin typeface="Cambria Math" charset="0"/>
+              <a:ea typeface="Cambria Math" charset="0"/>
+              <a:cs typeface="Cambria Math" charset="0"/>
+            </a:endParaRPr>
+          </a:p>
+        </p:txBody>
+      </p:sp>
+      <p:sp>
+        <p:nvSpPr>
+          <p:cNvPr id="3" name="Content Placeholder 2"/>
+          <p:cNvSpPr>
+            <a:spLocks noGrp="1"/>
+          </p:cNvSpPr>
+          <p:nvPr>
+            <p:ph idx="1"/>
+          </p:nvPr>
+        </p:nvSpPr>
+        <p:spPr/>
+        <p:txBody>
+          <a:bodyPr/>
+          <a:lstStyle/>
+          <a:p>
+            <a:r>
+              <a:rPr lang="en-GB" dirty="0" smtClean="0"/>
+              <a:t>Our data</a:t>
+            </a:r>
+            <a:endParaRPr lang="en-GB" dirty="0"/>
+          </a:p>
+        </p:txBody>
+      </p:sp>
+    </p:spTree>
+    <p:extLst>
+      <p:ext uri="{BB962C8B-B14F-4D97-AF65-F5344CB8AC3E}">
+        <p14:creationId xmlns:p14="http://schemas.microsoft.com/office/powerpoint/2010/main" val="1063944150"/>
       </p:ext>
     </p:extLst>
   </p:cSld>

</xml_diff>

<commit_message>
worked on pps presentation
from this morning to now, that's all i have done
</commit_message>
<xml_diff>
--- a/physics_problem_solving/supernova_cosmology_jacky_cao.pptx
+++ b/physics_problem_solving/supernova_cosmology_jacky_cao.pptx
@@ -607,14 +607,22 @@
           <a:lstStyle/>
           <a:p>
             <a:r>
-              <a:rPr lang="en-GB" smtClean="0"/>
+              <a:rPr lang="en-GB" dirty="0" smtClean="0"/>
               <a:t>-</a:t>
             </a:r>
             <a:r>
-              <a:rPr lang="en-GB" baseline="0" smtClean="0"/>
-              <a:t> the different topics that I would like to cover</a:t>
-            </a:r>
-            <a:endParaRPr lang="en-GB"/>
+              <a:rPr lang="en-GB" baseline="0" dirty="0" smtClean="0"/>
+              <a:t> </a:t>
+            </a:r>
+            <a:r>
+              <a:rPr lang="en-GB" baseline="0" dirty="0" smtClean="0"/>
+              <a:t>The </a:t>
+            </a:r>
+            <a:r>
+              <a:rPr lang="en-GB" baseline="0" dirty="0" smtClean="0"/>
+              <a:t>different topics that I would like to cover</a:t>
+            </a:r>
+            <a:endParaRPr lang="en-GB" dirty="0"/>
           </a:p>
         </p:txBody>
       </p:sp>
@@ -704,22 +712,1051 @@
             </a:pPr>
             <a:r>
               <a:rPr lang="en-GB" dirty="0" smtClean="0"/>
-              <a:t>No point having values for cosmological</a:t>
+              <a:t>These</a:t>
             </a:r>
             <a:r>
               <a:rPr lang="en-GB" baseline="0" dirty="0" smtClean="0"/>
-              <a:t> parameters if we cannot say to what uncertainty it is in, it provides no reasonable amount of information. It could be an extremely bad value</a:t>
-            </a:r>
+              <a:t> are the basic distinctions between the two main groups of supernovae explosions, detail this, then go into more detail with Type </a:t>
+            </a:r>
+            <a:r>
+              <a:rPr lang="en-GB" baseline="0" dirty="0" err="1" smtClean="0"/>
+              <a:t>Ia</a:t>
+            </a:r>
+            <a:endParaRPr lang="en-GB" dirty="0" smtClean="0"/>
           </a:p>
           <a:p>
             <a:pPr marL="171450" indent="-171450">
               <a:buFontTx/>
               <a:buChar char="-"/>
             </a:pPr>
-            <a:endParaRPr lang="en-GB" dirty="0"/>
-          </a:p>
-        </p:txBody>
-      </p:sp>
+            <a:r>
+              <a:rPr lang="en-GB" dirty="0" smtClean="0"/>
+              <a:t>Type</a:t>
+            </a:r>
+            <a:r>
+              <a:rPr lang="en-GB" baseline="0" dirty="0" smtClean="0"/>
+              <a:t> I</a:t>
+            </a:r>
+          </a:p>
+          <a:p>
+            <a:pPr marL="628650" lvl="1" indent="-171450">
+              <a:buFontTx/>
+              <a:buChar char="-"/>
+            </a:pPr>
+            <a:r>
+              <a:rPr lang="en-GB" baseline="0" dirty="0" smtClean="0"/>
+              <a:t>Binary system: this is the most accepted theory on how Type I’s are formed, discuss more about this in Type Ia. Mass accretes onto the main white dwarf until it reaches a point where a mechanism can trigger an explosion.</a:t>
+            </a:r>
+          </a:p>
+          <a:p>
+            <a:pPr marL="628650" lvl="1" indent="-171450">
+              <a:buFontTx/>
+              <a:buChar char="-"/>
+            </a:pPr>
+            <a:r>
+              <a:rPr lang="en-GB" baseline="0" dirty="0" smtClean="0"/>
+              <a:t>The Hydrogen line is not there as it is related to the initial system, the binary system leads to the absence. The way the supernova explodes within that system</a:t>
+            </a:r>
+          </a:p>
+          <a:p>
+            <a:pPr marL="171450" lvl="0" indent="-171450">
+              <a:buFontTx/>
+              <a:buChar char="-"/>
+            </a:pPr>
+            <a:r>
+              <a:rPr lang="en-GB" baseline="0" dirty="0" smtClean="0"/>
+              <a:t>Type II</a:t>
+            </a:r>
+          </a:p>
+          <a:p>
+            <a:pPr marL="628650" lvl="1" indent="-171450">
+              <a:buFontTx/>
+              <a:buChar char="-"/>
+            </a:pPr>
+            <a:r>
+              <a:rPr lang="en-GB" baseline="0" dirty="0" smtClean="0"/>
+              <a:t>Core collapse due to the mass increasing to a point where photodisintegration can occur, this leads to a runaway effect, and a loss of electron degeneracy pressure, thus the star explodes in a supernova</a:t>
+            </a:r>
+          </a:p>
+          <a:p>
+            <a:pPr marL="628650" lvl="1" indent="-171450">
+              <a:buFontTx/>
+              <a:buChar char="-"/>
+            </a:pPr>
+            <a:r>
+              <a:rPr lang="en-GB" baseline="0" dirty="0" smtClean="0"/>
+              <a:t>Balmer series present as there is still hydrogen when it explodes </a:t>
+            </a:r>
+          </a:p>
+          <a:p>
+            <a:pPr marL="171450" lvl="0" indent="-171450">
+              <a:buFontTx/>
+              <a:buChar char="-"/>
+            </a:pPr>
+            <a:endParaRPr lang="en-GB" baseline="0" dirty="0" smtClean="0"/>
+          </a:p>
+          <a:p>
+            <a:pPr marL="171450" lvl="0" indent="-171450">
+              <a:buFontTx/>
+              <a:buChar char="-"/>
+            </a:pPr>
+            <a:r>
+              <a:rPr lang="en-GB" baseline="0" dirty="0" smtClean="0"/>
+              <a:t>Sub-classifications</a:t>
+            </a:r>
+          </a:p>
+          <a:p>
+            <a:pPr marL="628650" lvl="1" indent="-171450">
+              <a:buFontTx/>
+              <a:buChar char="-"/>
+            </a:pPr>
+            <a:r>
+              <a:rPr lang="en-GB" baseline="0" dirty="0" smtClean="0"/>
+              <a:t>Type </a:t>
+            </a:r>
+            <a:r>
+              <a:rPr lang="en-GB" baseline="0" dirty="0" err="1" smtClean="0"/>
+              <a:t>Ia</a:t>
+            </a:r>
+            <a:r>
+              <a:rPr lang="en-GB" baseline="0" dirty="0" smtClean="0"/>
+              <a:t> </a:t>
+            </a:r>
+          </a:p>
+          <a:p>
+            <a:pPr marL="1085850" lvl="2" indent="-171450">
+              <a:buFontTx/>
+              <a:buChar char="-"/>
+            </a:pPr>
+            <a:r>
+              <a:rPr lang="en-GB" baseline="0" dirty="0" smtClean="0"/>
+              <a:t>This is the most important type for our cosmology as Type I </a:t>
+            </a:r>
+            <a:r>
+              <a:rPr lang="en-GB" baseline="0" dirty="0" err="1" smtClean="0"/>
+              <a:t>SNe</a:t>
+            </a:r>
+            <a:r>
+              <a:rPr lang="en-GB" baseline="0" dirty="0" smtClean="0"/>
+              <a:t> are ’standardised’ in the way they explode, they produce standard light curves when their magnitude is measured over a period of time</a:t>
+            </a:r>
+          </a:p>
+          <a:p>
+            <a:pPr marL="628650" lvl="1" indent="-171450">
+              <a:buFontTx/>
+              <a:buChar char="-"/>
+            </a:pPr>
+            <a:r>
+              <a:rPr lang="en-GB" baseline="0" dirty="0" smtClean="0"/>
+              <a:t>Type IIP, Type IIL</a:t>
+            </a:r>
+          </a:p>
+          <a:p>
+            <a:pPr marL="1085850" lvl="2" indent="-171450">
+              <a:buFontTx/>
+              <a:buChar char="-"/>
+            </a:pPr>
+            <a:r>
+              <a:rPr lang="en-GB" baseline="0" dirty="0" smtClean="0"/>
+              <a:t>Type IIP has a plateau in it’s light curve</a:t>
+            </a:r>
+          </a:p>
+          <a:p>
+            <a:pPr marL="1085850" lvl="2" indent="-171450">
+              <a:buFontTx/>
+              <a:buChar char="-"/>
+            </a:pPr>
+            <a:r>
+              <a:rPr lang="en-GB" baseline="0" dirty="0" smtClean="0"/>
+              <a:t>Type IIL has a line in it’s light curve</a:t>
+            </a:r>
+          </a:p>
+          <a:p>
+            <a:pPr marL="1085850" lvl="2" indent="-171450">
+              <a:buFontTx/>
+              <a:buChar char="-"/>
+            </a:pPr>
+            <a:endParaRPr lang="en-GB" baseline="0" dirty="0" smtClean="0"/>
+          </a:p>
+        </p:txBody>
+      </p:sp>
+      <p:sp>
+        <p:nvSpPr>
+          <p:cNvPr id="4" name="Slide Number Placeholder 3"/>
+          <p:cNvSpPr>
+            <a:spLocks noGrp="1"/>
+          </p:cNvSpPr>
+          <p:nvPr>
+            <p:ph type="sldNum" sz="quarter" idx="10"/>
+          </p:nvPr>
+        </p:nvSpPr>
+        <p:spPr/>
+        <p:txBody>
+          <a:bodyPr/>
+          <a:lstStyle/>
+          <a:p>
+            <a:fld id="{6CAB2768-F516-4545-BFD7-27EF3C6F6EB8}" type="slidenum">
+              <a:rPr lang="en-GB" smtClean="0"/>
+              <a:t>3</a:t>
+            </a:fld>
+            <a:endParaRPr lang="en-GB"/>
+          </a:p>
+        </p:txBody>
+      </p:sp>
+    </p:spTree>
+    <p:extLst>
+      <p:ext uri="{BB962C8B-B14F-4D97-AF65-F5344CB8AC3E}">
+        <p14:creationId xmlns:p14="http://schemas.microsoft.com/office/powerpoint/2010/main" val="354801443"/>
+      </p:ext>
+    </p:extLst>
+  </p:cSld>
+  <p:clrMapOvr>
+    <a:masterClrMapping/>
+  </p:clrMapOvr>
+</p:notes>
+</file>
+
+<file path=ppt/notesSlides/notesSlide4.xml><?xml version="1.0" encoding="utf-8"?>
+<p:notes xmlns:a="http://schemas.openxmlformats.org/drawingml/2006/main" xmlns:r="http://schemas.openxmlformats.org/officeDocument/2006/relationships" xmlns:p="http://schemas.openxmlformats.org/presentationml/2006/main">
+  <p:cSld>
+    <p:spTree>
+      <p:nvGrpSpPr>
+        <p:cNvPr id="1" name=""/>
+        <p:cNvGrpSpPr/>
+        <p:nvPr/>
+      </p:nvGrpSpPr>
+      <p:grpSpPr>
+        <a:xfrm>
+          <a:off x="0" y="0"/>
+          <a:ext cx="0" cy="0"/>
+          <a:chOff x="0" y="0"/>
+          <a:chExt cx="0" cy="0"/>
+        </a:xfrm>
+      </p:grpSpPr>
+      <p:sp>
+        <p:nvSpPr>
+          <p:cNvPr id="2" name="Slide Image Placeholder 1"/>
+          <p:cNvSpPr>
+            <a:spLocks noGrp="1" noRot="1" noChangeAspect="1"/>
+          </p:cNvSpPr>
+          <p:nvPr>
+            <p:ph type="sldImg"/>
+          </p:nvPr>
+        </p:nvSpPr>
+        <p:spPr/>
+      </p:sp>
+      <p:sp>
+        <p:nvSpPr>
+          <p:cNvPr id="3" name="Notes Placeholder 2"/>
+          <p:cNvSpPr>
+            <a:spLocks noGrp="1"/>
+          </p:cNvSpPr>
+          <p:nvPr>
+            <p:ph type="body" idx="1"/>
+          </p:nvPr>
+        </p:nvSpPr>
+        <p:spPr/>
+        <p:txBody>
+          <a:bodyPr/>
+          <a:lstStyle/>
+          <a:p>
+            <a:pPr marL="628650" marR="0" lvl="1" indent="-171450" algn="l" defTabSz="914400" rtl="0" eaLnBrk="1" fontAlgn="auto" latinLnBrk="0" hangingPunct="1">
+              <a:lnSpc>
+                <a:spcPct val="100000"/>
+              </a:lnSpc>
+              <a:spcBef>
+                <a:spcPts val="0"/>
+              </a:spcBef>
+              <a:spcAft>
+                <a:spcPts val="0"/>
+              </a:spcAft>
+              <a:buClrTx/>
+              <a:buSzTx/>
+              <a:buFontTx/>
+              <a:buChar char="-"/>
+              <a:tabLst/>
+              <a:defRPr/>
+            </a:pPr>
+            <a:r>
+              <a:rPr lang="en-GB" baseline="0" dirty="0" smtClean="0"/>
+              <a:t>The standardised way is due to the white dwarf accreting matter until it reaches the Chandrasekhar limit, 1.4M_solar, but it’s not the mass that’s the mechanism, it’s the fact there is extra thermonuclear energy being produced because of the fusion of the carbon and oxygen core, this creates a disruption and prevents a collapse into a neutron star</a:t>
+            </a:r>
+          </a:p>
+          <a:p>
+            <a:pPr marL="628650" marR="0" lvl="1" indent="-171450" algn="l" defTabSz="914400" rtl="0" eaLnBrk="1" fontAlgn="auto" latinLnBrk="0" hangingPunct="1">
+              <a:lnSpc>
+                <a:spcPct val="100000"/>
+              </a:lnSpc>
+              <a:spcBef>
+                <a:spcPts val="0"/>
+              </a:spcBef>
+              <a:spcAft>
+                <a:spcPts val="0"/>
+              </a:spcAft>
+              <a:buClrTx/>
+              <a:buSzTx/>
+              <a:buFontTx/>
+              <a:buChar char="-"/>
+              <a:tabLst/>
+              <a:defRPr/>
+            </a:pPr>
+            <a:r>
+              <a:rPr lang="en-GB" baseline="0" dirty="0" smtClean="0"/>
+              <a:t>Observing the magnitude of Type </a:t>
+            </a:r>
+            <a:r>
+              <a:rPr lang="en-GB" baseline="0" dirty="0" err="1" smtClean="0"/>
+              <a:t>Ia</a:t>
+            </a:r>
+            <a:r>
+              <a:rPr lang="en-GB" baseline="0" dirty="0" smtClean="0"/>
+              <a:t> </a:t>
+            </a:r>
+            <a:r>
+              <a:rPr lang="en-GB" baseline="0" dirty="0" err="1" smtClean="0"/>
+              <a:t>SNe</a:t>
+            </a:r>
+            <a:r>
+              <a:rPr lang="en-GB" baseline="0" dirty="0" smtClean="0"/>
+              <a:t> over an extended period allows us to plot light curves</a:t>
+            </a:r>
+          </a:p>
+          <a:p>
+            <a:pPr marL="628650" marR="0" lvl="1" indent="-171450" algn="l" defTabSz="914400" rtl="0" eaLnBrk="1" fontAlgn="auto" latinLnBrk="0" hangingPunct="1">
+              <a:lnSpc>
+                <a:spcPct val="100000"/>
+              </a:lnSpc>
+              <a:spcBef>
+                <a:spcPts val="0"/>
+              </a:spcBef>
+              <a:spcAft>
+                <a:spcPts val="0"/>
+              </a:spcAft>
+              <a:buClrTx/>
+              <a:buSzTx/>
+              <a:buFontTx/>
+              <a:buChar char="-"/>
+              <a:tabLst/>
+              <a:defRPr/>
+            </a:pPr>
+            <a:r>
+              <a:rPr lang="en-GB" baseline="0" dirty="0" smtClean="0"/>
+              <a:t>For multiple Type </a:t>
+            </a:r>
+            <a:r>
+              <a:rPr lang="en-GB" baseline="0" dirty="0" err="1" smtClean="0"/>
+              <a:t>Ia’s</a:t>
+            </a:r>
+            <a:r>
+              <a:rPr lang="en-GB" baseline="0" dirty="0" smtClean="0"/>
+              <a:t> we find that for the majority of </a:t>
+            </a:r>
+            <a:r>
+              <a:rPr lang="en-GB" baseline="0" dirty="0" err="1" smtClean="0"/>
+              <a:t>SNe</a:t>
+            </a:r>
+            <a:r>
+              <a:rPr lang="en-GB" baseline="0" dirty="0" smtClean="0"/>
+              <a:t> the standard curve is seen</a:t>
+            </a:r>
+          </a:p>
+          <a:p>
+            <a:pPr marL="628650" marR="0" lvl="1" indent="-171450" algn="l" defTabSz="914400" rtl="0" eaLnBrk="1" fontAlgn="auto" latinLnBrk="0" hangingPunct="1">
+              <a:lnSpc>
+                <a:spcPct val="100000"/>
+              </a:lnSpc>
+              <a:spcBef>
+                <a:spcPts val="0"/>
+              </a:spcBef>
+              <a:spcAft>
+                <a:spcPts val="0"/>
+              </a:spcAft>
+              <a:buClrTx/>
+              <a:buSzTx/>
+              <a:buFontTx/>
+              <a:buChar char="-"/>
+              <a:tabLst/>
+              <a:defRPr/>
+            </a:pPr>
+            <a:r>
+              <a:rPr lang="en-GB" baseline="0" dirty="0" smtClean="0"/>
+              <a:t>There are some other classes of </a:t>
+            </a:r>
+            <a:r>
+              <a:rPr lang="en-GB" baseline="0" dirty="0" err="1" smtClean="0"/>
+              <a:t>SNe</a:t>
+            </a:r>
+            <a:r>
+              <a:rPr lang="en-GB" baseline="0" dirty="0" smtClean="0"/>
+              <a:t>, e.g. Type Ia-91bg </a:t>
+            </a:r>
+            <a:r>
+              <a:rPr lang="mr-IN" baseline="0" dirty="0" smtClean="0"/>
+              <a:t>–</a:t>
+            </a:r>
+            <a:r>
+              <a:rPr lang="en-GB" baseline="0" dirty="0" smtClean="0"/>
+              <a:t> these are the faintest class of </a:t>
+            </a:r>
+            <a:r>
+              <a:rPr lang="en-GB" baseline="0" dirty="0" err="1" smtClean="0"/>
+              <a:t>SNe</a:t>
+            </a:r>
+            <a:r>
+              <a:rPr lang="en-GB" baseline="0" dirty="0" smtClean="0"/>
+              <a:t> </a:t>
+            </a:r>
+          </a:p>
+          <a:p>
+            <a:pPr marL="628650" marR="0" lvl="1" indent="-171450" algn="l" defTabSz="914400" rtl="0" eaLnBrk="1" fontAlgn="auto" latinLnBrk="0" hangingPunct="1">
+              <a:lnSpc>
+                <a:spcPct val="100000"/>
+              </a:lnSpc>
+              <a:spcBef>
+                <a:spcPts val="0"/>
+              </a:spcBef>
+              <a:spcAft>
+                <a:spcPts val="0"/>
+              </a:spcAft>
+              <a:buClrTx/>
+              <a:buSzTx/>
+              <a:buFontTx/>
+              <a:buChar char="-"/>
+              <a:tabLst/>
+              <a:defRPr/>
+            </a:pPr>
+            <a:r>
+              <a:rPr lang="en-GB" baseline="0" dirty="0" smtClean="0"/>
+              <a:t>Figure 1 is an example of the different light curves that can observed when using different image filters, same SN but each band has different information associated with it</a:t>
+            </a:r>
+          </a:p>
+          <a:p>
+            <a:pPr marL="628650" lvl="1" indent="-171450">
+              <a:buFontTx/>
+              <a:buChar char="-"/>
+            </a:pPr>
+            <a:endParaRPr lang="en-GB" baseline="0" dirty="0" smtClean="0"/>
+          </a:p>
+          <a:p>
+            <a:pPr marL="628650" lvl="1" indent="-171450">
+              <a:buFontTx/>
+              <a:buChar char="-"/>
+            </a:pPr>
+            <a:r>
+              <a:rPr lang="en-GB" baseline="0" dirty="0" smtClean="0"/>
+              <a:t>Use in finding cosmological parameters:</a:t>
+            </a:r>
+          </a:p>
+          <a:p>
+            <a:pPr marL="1085850" lvl="2" indent="-171450">
+              <a:buFontTx/>
+              <a:buChar char="-"/>
+            </a:pPr>
+            <a:r>
+              <a:rPr lang="en-GB" baseline="0" dirty="0" smtClean="0"/>
+              <a:t>Type </a:t>
+            </a:r>
+            <a:r>
+              <a:rPr lang="en-GB" baseline="0" dirty="0" err="1" smtClean="0"/>
+              <a:t>Ia</a:t>
+            </a:r>
+            <a:r>
+              <a:rPr lang="en-GB" baseline="0" dirty="0" smtClean="0"/>
+              <a:t> </a:t>
+            </a:r>
+            <a:r>
+              <a:rPr lang="en-GB" baseline="0" dirty="0" err="1" smtClean="0"/>
+              <a:t>SNe</a:t>
+            </a:r>
+            <a:r>
+              <a:rPr lang="en-GB" baseline="0" dirty="0" smtClean="0"/>
+              <a:t> can be used as standard candles to calculate distances</a:t>
+            </a:r>
+          </a:p>
+          <a:p>
+            <a:pPr marL="1085850" lvl="2" indent="-171450">
+              <a:buFontTx/>
+              <a:buChar char="-"/>
+            </a:pPr>
+            <a:r>
+              <a:rPr lang="en-GB" baseline="0" dirty="0" smtClean="0"/>
+              <a:t>Through spectroscopic observations we can obtain the redshift of the SN, and it’s host galaxy</a:t>
+            </a:r>
+          </a:p>
+          <a:p>
+            <a:pPr marL="1085850" lvl="2" indent="-171450">
+              <a:buFontTx/>
+              <a:buChar char="-"/>
+            </a:pPr>
+            <a:r>
+              <a:rPr lang="en-GB" baseline="0" dirty="0" smtClean="0"/>
+              <a:t>We can also find the peak magnitude of the </a:t>
+            </a:r>
+            <a:r>
+              <a:rPr lang="en-GB" baseline="0" dirty="0" err="1" smtClean="0"/>
+              <a:t>SNe</a:t>
+            </a:r>
+            <a:r>
+              <a:rPr lang="en-GB" baseline="0" dirty="0" smtClean="0"/>
+              <a:t> from the light curves</a:t>
+            </a:r>
+          </a:p>
+          <a:p>
+            <a:pPr marL="628650" lvl="1" indent="-171450">
+              <a:buFontTx/>
+              <a:buChar char="-"/>
+            </a:pPr>
+            <a:r>
+              <a:rPr lang="en-GB" baseline="0" dirty="0" smtClean="0"/>
+              <a:t>Using this information we can use the Friedman equation to calculate cosmological parameters such as </a:t>
+            </a:r>
+            <a:r>
+              <a:rPr lang="en-GB" baseline="0" dirty="0" err="1" smtClean="0"/>
+              <a:t>Omega_Lambda</a:t>
+            </a:r>
+            <a:r>
+              <a:rPr lang="en-GB" baseline="0" dirty="0" smtClean="0"/>
+              <a:t> to determine the dark energy content of the universe.</a:t>
+            </a:r>
+          </a:p>
+          <a:p>
+            <a:pPr marL="628650" lvl="1" indent="-171450">
+              <a:buFontTx/>
+              <a:buChar char="-"/>
+            </a:pPr>
+            <a:endParaRPr lang="en-GB" baseline="0" dirty="0" smtClean="0"/>
+          </a:p>
+          <a:p>
+            <a:pPr marL="628650" lvl="1" indent="-171450">
+              <a:buFontTx/>
+              <a:buChar char="-"/>
+            </a:pPr>
+            <a:r>
+              <a:rPr lang="en-GB" baseline="0" dirty="0" smtClean="0"/>
+              <a:t>When using the Friedman equation we make assumptions such as</a:t>
+            </a:r>
+          </a:p>
+          <a:p>
+            <a:pPr marL="1085850" lvl="2" indent="-171450">
+              <a:buFontTx/>
+              <a:buChar char="-"/>
+            </a:pPr>
+            <a:r>
+              <a:rPr lang="en-GB" baseline="0" dirty="0" smtClean="0"/>
+              <a:t>The Universe is flat for local distances so we can assume that the </a:t>
+            </a:r>
+            <a:r>
+              <a:rPr lang="en-GB" baseline="0" dirty="0" err="1" smtClean="0"/>
+              <a:t>comoving</a:t>
+            </a:r>
+            <a:r>
+              <a:rPr lang="en-GB" baseline="0" dirty="0" smtClean="0"/>
+              <a:t> distance can be approximated by a linear term</a:t>
+            </a:r>
+          </a:p>
+        </p:txBody>
+      </p:sp>
+      <p:sp>
+        <p:nvSpPr>
+          <p:cNvPr id="4" name="Slide Number Placeholder 3"/>
+          <p:cNvSpPr>
+            <a:spLocks noGrp="1"/>
+          </p:cNvSpPr>
+          <p:nvPr>
+            <p:ph type="sldNum" sz="quarter" idx="10"/>
+          </p:nvPr>
+        </p:nvSpPr>
+        <p:spPr/>
+        <p:txBody>
+          <a:bodyPr/>
+          <a:lstStyle/>
+          <a:p>
+            <a:fld id="{6CAB2768-F516-4545-BFD7-27EF3C6F6EB8}" type="slidenum">
+              <a:rPr lang="en-GB" smtClean="0"/>
+              <a:t>4</a:t>
+            </a:fld>
+            <a:endParaRPr lang="en-GB"/>
+          </a:p>
+        </p:txBody>
+      </p:sp>
+    </p:spTree>
+    <p:extLst>
+      <p:ext uri="{BB962C8B-B14F-4D97-AF65-F5344CB8AC3E}">
+        <p14:creationId xmlns:p14="http://schemas.microsoft.com/office/powerpoint/2010/main" val="1700859846"/>
+      </p:ext>
+    </p:extLst>
+  </p:cSld>
+  <p:clrMapOvr>
+    <a:masterClrMapping/>
+  </p:clrMapOvr>
+</p:notes>
+</file>
+
+<file path=ppt/notesSlides/notesSlide5.xml><?xml version="1.0" encoding="utf-8"?>
+<p:notes xmlns:a="http://schemas.openxmlformats.org/drawingml/2006/main" xmlns:r="http://schemas.openxmlformats.org/officeDocument/2006/relationships" xmlns:p="http://schemas.openxmlformats.org/presentationml/2006/main">
+  <p:cSld>
+    <p:spTree>
+      <p:nvGrpSpPr>
+        <p:cNvPr id="1" name=""/>
+        <p:cNvGrpSpPr/>
+        <p:nvPr/>
+      </p:nvGrpSpPr>
+      <p:grpSpPr>
+        <a:xfrm>
+          <a:off x="0" y="0"/>
+          <a:ext cx="0" cy="0"/>
+          <a:chOff x="0" y="0"/>
+          <a:chExt cx="0" cy="0"/>
+        </a:xfrm>
+      </p:grpSpPr>
+      <p:sp>
+        <p:nvSpPr>
+          <p:cNvPr id="2" name="Slide Image Placeholder 1"/>
+          <p:cNvSpPr>
+            <a:spLocks noGrp="1" noRot="1" noChangeAspect="1"/>
+          </p:cNvSpPr>
+          <p:nvPr>
+            <p:ph type="sldImg"/>
+          </p:nvPr>
+        </p:nvSpPr>
+        <p:spPr/>
+      </p:sp>
+      <mc:AlternateContent xmlns:mc="http://schemas.openxmlformats.org/markup-compatibility/2006">
+        <mc:Choice xmlns:a14="http://schemas.microsoft.com/office/drawing/2010/main" Requires="a14">
+          <p:sp>
+            <p:nvSpPr>
+              <p:cNvPr id="3" name="Notes Placeholder 2"/>
+              <p:cNvSpPr>
+                <a:spLocks noGrp="1"/>
+              </p:cNvSpPr>
+              <p:nvPr>
+                <p:ph type="body" idx="1"/>
+              </p:nvPr>
+            </p:nvSpPr>
+            <p:spPr/>
+            <p:txBody>
+              <a:bodyPr/>
+              <a:lstStyle/>
+              <a:p>
+                <a:pPr marL="171450" indent="-171450">
+                  <a:buFontTx/>
+                  <a:buChar char="-"/>
+                </a:pPr>
+                <a:r>
+                  <a:rPr lang="en-GB" dirty="0" smtClean="0"/>
+                  <a:t>With data that</a:t>
+                </a:r>
+                <a:r>
+                  <a:rPr lang="en-GB" baseline="0" dirty="0" smtClean="0"/>
+                  <a:t> is provided we must always be sceptical of how they obtained their </a:t>
+                </a:r>
+                <a:endParaRPr lang="en-GB" dirty="0" smtClean="0"/>
+              </a:p>
+              <a:p>
+                <a:pPr marL="171450" indent="-171450">
+                  <a:buFontTx/>
+                  <a:buChar char="-"/>
+                </a:pPr>
+                <a:r>
+                  <a:rPr lang="en-GB" dirty="0" smtClean="0"/>
+                  <a:t>One of the key issues is</a:t>
+                </a:r>
+                <a:r>
+                  <a:rPr lang="en-GB" baseline="0" dirty="0" smtClean="0"/>
+                  <a:t> trying to find the uncertainties in our values </a:t>
+                </a:r>
+                <a:endParaRPr lang="en-GB" dirty="0" smtClean="0"/>
+              </a:p>
+              <a:p>
+                <a:pPr marL="628650" lvl="1" indent="-171450">
+                  <a:buFontTx/>
+                  <a:buChar char="-"/>
+                </a:pPr>
+                <a:r>
+                  <a:rPr lang="en-GB" dirty="0" smtClean="0"/>
+                  <a:t>There is no point having values for cosmological</a:t>
+                </a:r>
+                <a:r>
+                  <a:rPr lang="en-GB" baseline="0" dirty="0" smtClean="0"/>
+                  <a:t> parameters if we cannot say to what uncertainty it is in, it provides no reasonable amount of information. It could be an extremely bad value</a:t>
+                </a:r>
+              </a:p>
+              <a:p>
+                <a:pPr marL="171450" lvl="0" indent="-171450">
+                  <a:buFontTx/>
+                  <a:buChar char="-"/>
+                </a:pPr>
+                <a:r>
+                  <a:rPr lang="en-GB" baseline="0" dirty="0" smtClean="0"/>
+                  <a:t>Using larger data sets we can produce a smoother set of data so that when finding the uncertainties in our values for </a:t>
+                </a:r>
+                <a14:m>
+                  <m:oMath xmlns:m="http://schemas.openxmlformats.org/officeDocument/2006/math">
+                    <m:sSub>
+                      <m:sSubPr>
+                        <m:ctrlPr>
+                          <a:rPr lang="en-US" i="1" baseline="0" smtClean="0">
+                            <a:latin typeface="Cambria Math" charset="0"/>
+                          </a:rPr>
+                        </m:ctrlPr>
+                      </m:sSubPr>
+                      <m:e>
+                        <m:r>
+                          <m:rPr>
+                            <m:sty m:val="p"/>
+                          </m:rPr>
+                          <a:rPr lang="el-GR" i="1" baseline="0" smtClean="0">
+                            <a:latin typeface="Cambria Math" charset="0"/>
+                            <a:ea typeface="Cambria Math" charset="0"/>
+                            <a:cs typeface="Cambria Math" charset="0"/>
+                          </a:rPr>
+                          <m:t>Ω</m:t>
+                        </m:r>
+                      </m:e>
+                      <m:sub>
+                        <m:r>
+                          <m:rPr>
+                            <m:sty m:val="p"/>
+                          </m:rPr>
+                          <a:rPr lang="el-GR" i="1" baseline="0" smtClean="0">
+                            <a:latin typeface="Cambria Math" charset="0"/>
+                            <a:ea typeface="Cambria Math" charset="0"/>
+                            <a:cs typeface="Cambria Math" charset="0"/>
+                          </a:rPr>
+                          <m:t>Λ</m:t>
+                        </m:r>
+                      </m:sub>
+                    </m:sSub>
+                  </m:oMath>
+                </a14:m>
+                <a:r>
+                  <a:rPr lang="en-GB" baseline="0" dirty="0" smtClean="0"/>
+                  <a:t>, so that we can be more certain that our uncertainties found are more accurate than if we have a less complete data set (???) is that correct?</a:t>
+                </a:r>
+              </a:p>
+              <a:p>
+                <a:pPr marL="171450" lvl="0" indent="-171450">
+                  <a:buFontTx/>
+                  <a:buChar char="-"/>
+                </a:pPr>
+                <a:r>
+                  <a:rPr lang="en-GB" baseline="0" dirty="0" smtClean="0"/>
+                  <a:t>Plus we could investigate how SN type affects the uncertainties, or how galaxy type/host galaxy morphology affects it as well </a:t>
+                </a:r>
+                <a:r>
+                  <a:rPr lang="mr-IN" baseline="0" dirty="0" smtClean="0"/>
+                  <a:t>–</a:t>
+                </a:r>
+                <a:r>
+                  <a:rPr lang="en-GB" baseline="0" dirty="0" smtClean="0"/>
+                  <a:t> a form of ‘jack knife’ method in trying to see what range of uncertainties we can obtain</a:t>
+                </a:r>
+              </a:p>
+              <a:p>
+                <a:pPr marL="171450" lvl="0" indent="-171450">
+                  <a:buFontTx/>
+                  <a:buChar char="-"/>
+                </a:pPr>
+                <a:endParaRPr lang="en-GB" baseline="0" dirty="0" smtClean="0"/>
+              </a:p>
+              <a:p>
+                <a:pPr marL="171450" lvl="0" indent="-171450">
+                  <a:buFontTx/>
+                  <a:buChar char="-"/>
+                </a:pPr>
+                <a:r>
+                  <a:rPr lang="en-GB" baseline="0" dirty="0" smtClean="0"/>
+                  <a:t>Investigate another method as opposed to the </a:t>
+                </a:r>
+                <a14:m>
+                  <m:oMath xmlns:m="http://schemas.openxmlformats.org/officeDocument/2006/math">
+                    <m:sSup>
+                      <m:sSupPr>
+                        <m:ctrlPr>
+                          <a:rPr lang="en-GB" i="1" baseline="0" smtClean="0">
+                            <a:latin typeface="Cambria Math" charset="0"/>
+                          </a:rPr>
+                        </m:ctrlPr>
+                      </m:sSupPr>
+                      <m:e>
+                        <m:r>
+                          <a:rPr lang="en-GB" i="1" baseline="0" smtClean="0">
+                            <a:latin typeface="Cambria Math" charset="0"/>
+                            <a:ea typeface="Cambria Math" charset="0"/>
+                            <a:cs typeface="Cambria Math" charset="0"/>
+                          </a:rPr>
+                          <m:t>𝜒</m:t>
+                        </m:r>
+                      </m:e>
+                      <m:sup>
+                        <m:r>
+                          <a:rPr lang="en-GB" b="0" i="1" baseline="0" smtClean="0">
+                            <a:latin typeface="Cambria Math" charset="0"/>
+                          </a:rPr>
+                          <m:t>2</m:t>
+                        </m:r>
+                      </m:sup>
+                    </m:sSup>
+                  </m:oMath>
+                </a14:m>
+                <a:r>
+                  <a:rPr lang="en-GB" baseline="0" dirty="0" smtClean="0"/>
+                  <a:t> method which determines the error bars on the model parameters as well as the best fit values</a:t>
+                </a:r>
+              </a:p>
+              <a:p>
+                <a:pPr marL="171450" lvl="0" indent="-171450">
+                  <a:buFontTx/>
+                  <a:buChar char="-"/>
+                </a:pPr>
+                <a:r>
+                  <a:rPr lang="en-GB" baseline="0" dirty="0" smtClean="0"/>
+                  <a:t>Using the Markov Chain Monte Carlo method we can explore the fit of the data to other general cosmological models </a:t>
+                </a:r>
+                <a:r>
+                  <a:rPr lang="mr-IN" baseline="0" dirty="0" smtClean="0"/>
+                  <a:t>–</a:t>
+                </a:r>
+                <a:r>
+                  <a:rPr lang="en-GB" baseline="0" dirty="0" smtClean="0"/>
+                  <a:t> other cosmological methods will need to be researched but with the MCMC method, it is a method which is as follows:</a:t>
+                </a:r>
+              </a:p>
+              <a:p>
+                <a:pPr marL="628650" lvl="1" indent="-171450">
+                  <a:buFontTx/>
+                  <a:buChar char="-"/>
+                </a:pPr>
+                <a:r>
+                  <a:rPr lang="en-GB" baseline="0" dirty="0" smtClean="0"/>
+                  <a:t>We have a dataset D, and we can calculate the probability of the dataset given the values of the parameters of our model. We can then find a distribution function. </a:t>
+                </a:r>
+              </a:p>
+              <a:p>
+                <a:pPr marL="628650" lvl="1" indent="-171450">
+                  <a:buFontTx/>
+                  <a:buChar char="-"/>
+                </a:pPr>
+                <a:r>
+                  <a:rPr lang="en-GB" baseline="0" dirty="0" smtClean="0"/>
+                  <a:t>The advantage of MCMC is that it automatically puts the sample points where the distribution function is large</a:t>
+                </a:r>
+              </a:p>
+              <a:p>
+                <a:pPr marL="171450" lvl="0" indent="-171450">
+                  <a:buFontTx/>
+                  <a:buChar char="-"/>
+                </a:pPr>
+                <a:r>
+                  <a:rPr lang="en-GB" baseline="0" dirty="0" smtClean="0"/>
+                  <a:t>Exploring Bayesian statistics, we find a result from Bayes’ theorem that data changes probability </a:t>
+                </a:r>
+              </a:p>
+            </p:txBody>
+          </p:sp>
+        </mc:Choice>
+        <mc:Fallback>
+          <p:sp>
+            <p:nvSpPr>
+              <p:cNvPr id="3" name="Notes Placeholder 2"/>
+              <p:cNvSpPr>
+                <a:spLocks noGrp="1"/>
+              </p:cNvSpPr>
+              <p:nvPr>
+                <p:ph type="body" idx="1"/>
+              </p:nvPr>
+            </p:nvSpPr>
+            <p:spPr/>
+            <p:txBody>
+              <a:bodyPr/>
+              <a:lstStyle/>
+              <a:p>
+                <a:pPr marL="171450" indent="-171450">
+                  <a:buFontTx/>
+                  <a:buChar char="-"/>
+                </a:pPr>
+                <a:r>
+                  <a:rPr lang="en-GB" dirty="0" smtClean="0"/>
+                  <a:t>With data that</a:t>
+                </a:r>
+                <a:r>
+                  <a:rPr lang="en-GB" baseline="0" dirty="0" smtClean="0"/>
+                  <a:t> is provided we must always be sceptical of how they obtained their </a:t>
+                </a:r>
+                <a:endParaRPr lang="en-GB" dirty="0" smtClean="0"/>
+              </a:p>
+              <a:p>
+                <a:pPr marL="171450" indent="-171450">
+                  <a:buFontTx/>
+                  <a:buChar char="-"/>
+                </a:pPr>
+                <a:r>
+                  <a:rPr lang="en-GB" dirty="0" smtClean="0"/>
+                  <a:t>One of the key issues is</a:t>
+                </a:r>
+                <a:r>
+                  <a:rPr lang="en-GB" baseline="0" dirty="0" smtClean="0"/>
+                  <a:t> trying to find the uncertainties in our values </a:t>
+                </a:r>
+                <a:endParaRPr lang="en-GB" dirty="0" smtClean="0"/>
+              </a:p>
+              <a:p>
+                <a:pPr marL="628650" lvl="1" indent="-171450">
+                  <a:buFontTx/>
+                  <a:buChar char="-"/>
+                </a:pPr>
+                <a:r>
+                  <a:rPr lang="en-GB" dirty="0" smtClean="0"/>
+                  <a:t>There is no point having values for cosmological</a:t>
+                </a:r>
+                <a:r>
+                  <a:rPr lang="en-GB" baseline="0" dirty="0" smtClean="0"/>
+                  <a:t> parameters if we cannot say to what uncertainty it is in, it provides no reasonable amount of information. It could be an extremely bad value</a:t>
+                </a:r>
+              </a:p>
+              <a:p>
+                <a:pPr marL="171450" lvl="0" indent="-171450">
+                  <a:buFontTx/>
+                  <a:buChar char="-"/>
+                </a:pPr>
+                <a:r>
+                  <a:rPr lang="en-GB" baseline="0" dirty="0" smtClean="0"/>
+                  <a:t>Using larger data sets we can produce a smoother set of data so that when finding the uncertainties in our values for </a:t>
+                </a:r>
+                <a:r>
+                  <a:rPr lang="el-GR" i="0" baseline="0" smtClean="0">
+                    <a:latin typeface="Cambria Math" charset="0"/>
+                    <a:ea typeface="Cambria Math" charset="0"/>
+                    <a:cs typeface="Cambria Math" charset="0"/>
+                  </a:rPr>
+                  <a:t>Ω</a:t>
+                </a:r>
+                <a:r>
+                  <a:rPr lang="en-US" i="0" baseline="0" smtClean="0">
+                    <a:latin typeface="Cambria Math" charset="0"/>
+                    <a:ea typeface="Cambria Math" charset="0"/>
+                    <a:cs typeface="Cambria Math" charset="0"/>
+                  </a:rPr>
+                  <a:t>_</a:t>
+                </a:r>
+                <a:r>
+                  <a:rPr lang="el-GR" i="0" baseline="0" smtClean="0">
+                    <a:latin typeface="Cambria Math" charset="0"/>
+                    <a:ea typeface="Cambria Math" charset="0"/>
+                    <a:cs typeface="Cambria Math" charset="0"/>
+                  </a:rPr>
+                  <a:t>Λ</a:t>
+                </a:r>
+                <a:r>
+                  <a:rPr lang="en-GB" baseline="0" dirty="0" smtClean="0"/>
+                  <a:t>, so that we can be more certain that our uncertainties found are more accurate than if we have a less complete data set (???) is that correct?</a:t>
+                </a:r>
+              </a:p>
+              <a:p>
+                <a:pPr marL="171450" lvl="0" indent="-171450">
+                  <a:buFontTx/>
+                  <a:buChar char="-"/>
+                </a:pPr>
+                <a:r>
+                  <a:rPr lang="en-GB" baseline="0" dirty="0" smtClean="0"/>
+                  <a:t>Plus we could investigate how SN type affects the uncertainties, or how galaxy type/host galaxy morphology affects it as well </a:t>
+                </a:r>
+                <a:r>
+                  <a:rPr lang="mr-IN" baseline="0" dirty="0" smtClean="0"/>
+                  <a:t>–</a:t>
+                </a:r>
+                <a:r>
+                  <a:rPr lang="en-GB" baseline="0" dirty="0" smtClean="0"/>
+                  <a:t> a form of ‘jack knife’ method in trying to see what range of uncertainties we can obtain</a:t>
+                </a:r>
+              </a:p>
+              <a:p>
+                <a:pPr marL="171450" lvl="0" indent="-171450">
+                  <a:buFontTx/>
+                  <a:buChar char="-"/>
+                </a:pPr>
+                <a:endParaRPr lang="en-GB" baseline="0" dirty="0" smtClean="0"/>
+              </a:p>
+              <a:p>
+                <a:pPr marL="171450" lvl="0" indent="-171450">
+                  <a:buFontTx/>
+                  <a:buChar char="-"/>
+                </a:pPr>
+                <a:r>
+                  <a:rPr lang="en-GB" baseline="0" dirty="0" smtClean="0"/>
+                  <a:t>Investigate another method as opposed to the </a:t>
+                </a:r>
+                <a:r>
+                  <a:rPr lang="en-GB" i="0" baseline="0" smtClean="0">
+                    <a:latin typeface="Cambria Math" charset="0"/>
+                    <a:ea typeface="Cambria Math" charset="0"/>
+                    <a:cs typeface="Cambria Math" charset="0"/>
+                  </a:rPr>
+                  <a:t>𝜒^</a:t>
+                </a:r>
+                <a:r>
+                  <a:rPr lang="en-GB" b="0" i="0" baseline="0" smtClean="0">
+                    <a:latin typeface="Cambria Math" charset="0"/>
+                  </a:rPr>
+                  <a:t>2</a:t>
+                </a:r>
+                <a:r>
+                  <a:rPr lang="en-GB" baseline="0" dirty="0" smtClean="0"/>
+                  <a:t> method which determines the error bars on the model parameters as well as the best fit values</a:t>
+                </a:r>
+              </a:p>
+              <a:p>
+                <a:pPr marL="171450" lvl="0" indent="-171450">
+                  <a:buFontTx/>
+                  <a:buChar char="-"/>
+                </a:pPr>
+                <a:r>
+                  <a:rPr lang="en-GB" baseline="0" dirty="0" smtClean="0"/>
+                  <a:t>Using the Markov Chain Monte Carlo method we can explore the fit of the data to other general cosmological models </a:t>
+                </a:r>
+                <a:r>
+                  <a:rPr lang="mr-IN" baseline="0" dirty="0" smtClean="0"/>
+                  <a:t>–</a:t>
+                </a:r>
+                <a:r>
+                  <a:rPr lang="en-GB" baseline="0" dirty="0" smtClean="0"/>
+                  <a:t> other cosmological methods will need to be researched but with the MCMC method, it is a method which is as follows:</a:t>
+                </a:r>
+              </a:p>
+              <a:p>
+                <a:pPr marL="628650" lvl="1" indent="-171450">
+                  <a:buFontTx/>
+                  <a:buChar char="-"/>
+                </a:pPr>
+                <a:r>
+                  <a:rPr lang="en-GB" baseline="0" dirty="0" smtClean="0"/>
+                  <a:t>We have a dataset D, and we can calculate the probability of the dataset given the values of the parameters of our model. We can then find a distribution function. </a:t>
+                </a:r>
+              </a:p>
+              <a:p>
+                <a:pPr marL="628650" lvl="1" indent="-171450">
+                  <a:buFontTx/>
+                  <a:buChar char="-"/>
+                </a:pPr>
+                <a:r>
+                  <a:rPr lang="en-GB" baseline="0" dirty="0" smtClean="0"/>
+                  <a:t>The advantage of MCMC is that it automatically puts the sample points where the distribution function is large</a:t>
+                </a:r>
+              </a:p>
+              <a:p>
+                <a:pPr marL="171450" lvl="0" indent="-171450">
+                  <a:buFontTx/>
+                  <a:buChar char="-"/>
+                </a:pPr>
+                <a:r>
+                  <a:rPr lang="en-GB" baseline="0" dirty="0" smtClean="0"/>
+                  <a:t>Exploring Bayesian statistics, we find a result from Bayes’ theorem that data changes probability </a:t>
+                </a:r>
+              </a:p>
+            </p:txBody>
+          </p:sp>
+        </mc:Fallback>
+      </mc:AlternateContent>
       <p:sp>
         <p:nvSpPr>
           <p:cNvPr id="4" name="Slide Number Placeholder 3"/>
@@ -3685,6 +4722,13 @@
   <p:clrMapOvr>
     <a:masterClrMapping/>
   </p:clrMapOvr>
+  <p:timing>
+    <p:tnLst>
+      <p:par>
+        <p:cTn id="1" dur="indefinite" restart="never" nodeType="tmRoot"/>
+      </p:par>
+    </p:tnLst>
+  </p:timing>
 </p:sld>
 </file>
 
@@ -3820,6 +4864,13 @@
   <p:clrMapOvr>
     <a:masterClrMapping/>
   </p:clrMapOvr>
+  <p:timing>
+    <p:tnLst>
+      <p:par>
+        <p:cTn id="1" dur="indefinite" restart="never" nodeType="tmRoot"/>
+      </p:par>
+    </p:tnLst>
+  </p:timing>
 </p:sld>
 </file>
 
@@ -3914,7 +4965,31 @@
                 <a:ea typeface="Times New Roman" charset="0"/>
                 <a:cs typeface="Times New Roman" charset="0"/>
               </a:rPr>
-              <a:t>An absence of the hydrogen in it’s spectrum</a:t>
+              <a:t>An absence of </a:t>
+            </a:r>
+            <a:r>
+              <a:rPr lang="en-GB" dirty="0" smtClean="0">
+                <a:latin typeface="Times New Roman" charset="0"/>
+                <a:ea typeface="Times New Roman" charset="0"/>
+                <a:cs typeface="Times New Roman" charset="0"/>
+              </a:rPr>
+              <a:t>the Balmer series of Hydrogen </a:t>
+            </a:r>
+            <a:r>
+              <a:rPr lang="en-GB" dirty="0" smtClean="0">
+                <a:latin typeface="Times New Roman" charset="0"/>
+                <a:ea typeface="Times New Roman" charset="0"/>
+                <a:cs typeface="Times New Roman" charset="0"/>
+              </a:rPr>
+              <a:t>in it’s </a:t>
+            </a:r>
+            <a:r>
+              <a:rPr lang="en-GB" dirty="0" smtClean="0">
+                <a:latin typeface="Times New Roman" charset="0"/>
+                <a:ea typeface="Times New Roman" charset="0"/>
+                <a:cs typeface="Times New Roman" charset="0"/>
+              </a:rPr>
+              <a:t>spectrum</a:t>
             </a:r>
             <a:endParaRPr lang="en-GB" dirty="0">
               <a:latin typeface="Times New Roman" charset="0"/>
@@ -3964,7 +5039,7 @@
                 <a:ea typeface="Times New Roman" charset="0"/>
                 <a:cs typeface="Times New Roman" charset="0"/>
               </a:rPr>
-              <a:t>Features the hydrogen feature</a:t>
+              <a:t>Balmer series of Hydrogen present</a:t>
             </a:r>
             <a:endParaRPr lang="en-GB" dirty="0">
               <a:latin typeface="Times New Roman" charset="0"/>
@@ -4095,6 +5170,13 @@
   <p:clrMapOvr>
     <a:masterClrMapping/>
   </p:clrMapOvr>
+  <p:timing>
+    <p:tnLst>
+      <p:par>
+        <p:cTn id="1" dur="indefinite" restart="never" nodeType="tmRoot"/>
+      </p:par>
+    </p:tnLst>
+  </p:timing>
 </p:sld>
 </file>
 
@@ -4183,7 +5265,7 @@
                 <a:ea typeface="Times New Roman" charset="0"/>
                 <a:cs typeface="Times New Roman" charset="0"/>
               </a:rPr>
-              <a:t>Si feature ???</a:t>
+              <a:t>Standardised explosion mechanism</a:t>
             </a:r>
           </a:p>
           <a:p>
@@ -4193,21 +5275,8 @@
                 <a:ea typeface="Times New Roman" charset="0"/>
                 <a:cs typeface="Times New Roman" charset="0"/>
               </a:rPr>
-              <a:t>There is still doubt in the model of </a:t>
-            </a:r>
-            <a:r>
-              <a:rPr lang="en-GB" dirty="0" err="1" smtClean="0">
-                <a:latin typeface="Times New Roman" charset="0"/>
-                <a:ea typeface="Times New Roman" charset="0"/>
-                <a:cs typeface="Times New Roman" charset="0"/>
-              </a:rPr>
-              <a:t>presupernova</a:t>
-            </a:r>
-            <a:endParaRPr lang="en-GB" dirty="0" smtClean="0">
-              <a:latin typeface="Times New Roman" charset="0"/>
-              <a:ea typeface="Times New Roman" charset="0"/>
-              <a:cs typeface="Times New Roman" charset="0"/>
-            </a:endParaRPr>
+              <a:t>Usage in finding cosmological parameters</a:t>
+            </a:r>
           </a:p>
           <a:p>
             <a:r>
@@ -4216,23 +5285,19 @@
                 <a:ea typeface="Times New Roman" charset="0"/>
                 <a:cs typeface="Times New Roman" charset="0"/>
               </a:rPr>
-              <a:t>Usage in finding cosmological parameters</a:t>
-            </a:r>
-          </a:p>
-          <a:p>
+              <a:t>The Friedman equation</a:t>
+            </a:r>
+          </a:p>
+          <a:p>
+            <a:pPr lvl="1"/>
             <a:r>
               <a:rPr lang="en-GB" dirty="0" smtClean="0">
                 <a:latin typeface="Times New Roman" charset="0"/>
                 <a:ea typeface="Times New Roman" charset="0"/>
                 <a:cs typeface="Times New Roman" charset="0"/>
               </a:rPr>
-              <a:t>Friedman equation</a:t>
-            </a:r>
-            <a:endParaRPr lang="en-GB" dirty="0" smtClean="0">
-              <a:latin typeface="Times New Roman" charset="0"/>
-              <a:ea typeface="Times New Roman" charset="0"/>
-              <a:cs typeface="Times New Roman" charset="0"/>
-            </a:endParaRPr>
+              <a:t>add the equation in?</a:t>
+            </a:r>
           </a:p>
         </p:txBody>
       </p:sp>
@@ -4244,7 +5309,7 @@
         </p:nvSpPr>
         <p:spPr>
           <a:xfrm>
-            <a:off x="282387" y="6311900"/>
+            <a:off x="282387" y="6111872"/>
             <a:ext cx="12277165" cy="584775"/>
           </a:xfrm>
           <a:prstGeom prst="rect">
@@ -4321,7 +5386,136 @@
             </a:endParaRPr>
           </a:p>
           <a:p>
-            <a:endParaRPr lang="en-GB" sz="1600" dirty="0">
+            <a:r>
+              <a:rPr lang="en-GB" sz="1600" dirty="0" smtClean="0">
+                <a:latin typeface="Times New Roman" charset="0"/>
+                <a:ea typeface="Times New Roman" charset="0"/>
+                <a:cs typeface="Times New Roman" charset="0"/>
+              </a:rPr>
+              <a:t>Figure 1. Adapted from S. E. </a:t>
+            </a:r>
+            <a:r>
+              <a:rPr lang="en-GB" sz="1600" dirty="0" err="1" smtClean="0">
+                <a:latin typeface="Times New Roman" charset="0"/>
+                <a:ea typeface="Times New Roman" charset="0"/>
+                <a:cs typeface="Times New Roman" charset="0"/>
+              </a:rPr>
+              <a:t>Woosley</a:t>
+            </a:r>
+            <a:r>
+              <a:rPr lang="en-GB" sz="1600" dirty="0" smtClean="0">
+                <a:latin typeface="Times New Roman" charset="0"/>
+                <a:ea typeface="Times New Roman" charset="0"/>
+                <a:cs typeface="Times New Roman" charset="0"/>
+              </a:rPr>
+              <a:t> et al. Type </a:t>
+            </a:r>
+            <a:r>
+              <a:rPr lang="en-GB" sz="1600" dirty="0" err="1" smtClean="0">
+                <a:latin typeface="Times New Roman" charset="0"/>
+                <a:ea typeface="Times New Roman" charset="0"/>
+                <a:cs typeface="Times New Roman" charset="0"/>
+              </a:rPr>
+              <a:t>Ia</a:t>
+            </a:r>
+            <a:r>
+              <a:rPr lang="en-GB" sz="1600" dirty="0" smtClean="0">
+                <a:latin typeface="Times New Roman" charset="0"/>
+                <a:ea typeface="Times New Roman" charset="0"/>
+                <a:cs typeface="Times New Roman" charset="0"/>
+              </a:rPr>
+              <a:t> Supernova Light Curves. The Astrophysical Journal, 662:487-503, 2007.</a:t>
+            </a:r>
+          </a:p>
+        </p:txBody>
+      </p:sp>
+      <p:pic>
+        <p:nvPicPr>
+          <p:cNvPr id="5" name="Picture 4"/>
+          <p:cNvPicPr>
+            <a:picLocks noChangeAspect="1"/>
+          </p:cNvPicPr>
+          <p:nvPr/>
+        </p:nvPicPr>
+        <p:blipFill>
+          <a:blip r:embed="rId3">
+            <a:extLst>
+              <a:ext uri="{28A0092B-C50C-407E-A947-70E740481C1C}">
+                <a14:useLocalDpi xmlns:a14="http://schemas.microsoft.com/office/drawing/2010/main" val="0"/>
+              </a:ext>
+            </a:extLst>
+          </a:blip>
+          <a:stretch>
+            <a:fillRect/>
+          </a:stretch>
+        </p:blipFill>
+        <p:spPr>
+          <a:xfrm>
+            <a:off x="8191424" y="365125"/>
+            <a:ext cx="3632566" cy="5120480"/>
+          </a:xfrm>
+          <a:prstGeom prst="rect">
+            <a:avLst/>
+          </a:prstGeom>
+        </p:spPr>
+      </p:pic>
+      <p:sp>
+        <p:nvSpPr>
+          <p:cNvPr id="6" name="TextBox 5"/>
+          <p:cNvSpPr txBox="1"/>
+          <p:nvPr/>
+        </p:nvSpPr>
+        <p:spPr>
+          <a:xfrm>
+            <a:off x="8191424" y="5453688"/>
+            <a:ext cx="3867918" cy="461665"/>
+          </a:xfrm>
+          <a:prstGeom prst="rect">
+            <a:avLst/>
+          </a:prstGeom>
+          <a:noFill/>
+        </p:spPr>
+        <p:txBody>
+          <a:bodyPr wrap="none" rtlCol="0">
+            <a:spAutoFit/>
+          </a:bodyPr>
+          <a:lstStyle/>
+          <a:p>
+            <a:r>
+              <a:rPr lang="en-GB" sz="1200" b="1" dirty="0" smtClean="0">
+                <a:latin typeface="Times New Roman" charset="0"/>
+                <a:ea typeface="Times New Roman" charset="0"/>
+                <a:cs typeface="Times New Roman" charset="0"/>
+              </a:rPr>
+              <a:t>Figure 1. Type </a:t>
+            </a:r>
+            <a:r>
+              <a:rPr lang="en-GB" sz="1200" b="1" dirty="0" err="1" smtClean="0">
+                <a:latin typeface="Times New Roman" charset="0"/>
+                <a:ea typeface="Times New Roman" charset="0"/>
+                <a:cs typeface="Times New Roman" charset="0"/>
+              </a:rPr>
+              <a:t>Ia</a:t>
+            </a:r>
+            <a:r>
+              <a:rPr lang="en-GB" sz="1200" b="1" dirty="0" smtClean="0">
+                <a:latin typeface="Times New Roman" charset="0"/>
+                <a:ea typeface="Times New Roman" charset="0"/>
+                <a:cs typeface="Times New Roman" charset="0"/>
+              </a:rPr>
+              <a:t> SN light curves in five different bands.</a:t>
+            </a:r>
+          </a:p>
+          <a:p>
+            <a:r>
+              <a:rPr lang="en-GB" sz="1200" b="1" dirty="0" smtClean="0">
+                <a:latin typeface="Times New Roman" charset="0"/>
+                <a:ea typeface="Times New Roman" charset="0"/>
+                <a:cs typeface="Times New Roman" charset="0"/>
+              </a:rPr>
+              <a:t>Data and model offset to produce a clearer image.</a:t>
+            </a:r>
+            <a:endParaRPr lang="en-GB" sz="1200" b="1" dirty="0">
               <a:latin typeface="Times New Roman" charset="0"/>
               <a:ea typeface="Times New Roman" charset="0"/>
               <a:cs typeface="Times New Roman" charset="0"/>
@@ -4339,6 +5533,13 @@
   <p:clrMapOvr>
     <a:masterClrMapping/>
   </p:clrMapOvr>
+  <p:timing>
+    <p:tnLst>
+      <p:par>
+        <p:cTn id="1" dur="indefinite" restart="never" nodeType="tmRoot"/>
+      </p:par>
+    </p:tnLst>
+  </p:timing>
 </p:sld>
 </file>
 
@@ -4390,68 +5591,172 @@
           </a:p>
         </p:txBody>
       </p:sp>
-      <p:sp>
-        <p:nvSpPr>
-          <p:cNvPr id="3" name="Content Placeholder 2"/>
-          <p:cNvSpPr>
-            <a:spLocks noGrp="1"/>
-          </p:cNvSpPr>
-          <p:nvPr>
-            <p:ph idx="1"/>
-          </p:nvPr>
-        </p:nvSpPr>
-        <p:spPr/>
-        <p:txBody>
-          <a:bodyPr/>
-          <a:lstStyle/>
-          <a:p>
-            <a:r>
-              <a:rPr lang="en-GB" dirty="0" smtClean="0">
-                <a:latin typeface="Times New Roman" charset="0"/>
-                <a:ea typeface="Times New Roman" charset="0"/>
-                <a:cs typeface="Times New Roman" charset="0"/>
-              </a:rPr>
-              <a:t>Uncertainties in data sets</a:t>
-            </a:r>
-          </a:p>
-          <a:p>
-            <a:r>
-              <a:rPr lang="en-GB" dirty="0" smtClean="0">
-                <a:latin typeface="Times New Roman" charset="0"/>
-                <a:ea typeface="Times New Roman" charset="0"/>
-                <a:cs typeface="Times New Roman" charset="0"/>
-              </a:rPr>
-              <a:t>Larger data sets</a:t>
-            </a:r>
-          </a:p>
-          <a:p>
-            <a:pPr lvl="1"/>
-            <a:r>
-              <a:rPr lang="en-GB" dirty="0" smtClean="0">
-                <a:latin typeface="Times New Roman" charset="0"/>
-                <a:ea typeface="Times New Roman" charset="0"/>
-                <a:cs typeface="Times New Roman" charset="0"/>
-              </a:rPr>
-              <a:t>Good things and bad things about this</a:t>
-            </a:r>
-          </a:p>
-          <a:p>
-            <a:r>
-              <a:rPr lang="en-GB" dirty="0" smtClean="0">
-                <a:latin typeface="Times New Roman" charset="0"/>
-                <a:ea typeface="Times New Roman" charset="0"/>
-                <a:cs typeface="Times New Roman" charset="0"/>
-              </a:rPr>
-              <a:t>Obtaining another measure for the quality of fit for the data to the model</a:t>
-            </a:r>
-            <a:endParaRPr lang="en-GB" dirty="0" smtClean="0">
-              <a:latin typeface="Times New Roman" charset="0"/>
-              <a:ea typeface="Times New Roman" charset="0"/>
-              <a:cs typeface="Times New Roman" charset="0"/>
-            </a:endParaRPr>
-          </a:p>
-        </p:txBody>
-      </p:sp>
+      <mc:AlternateContent xmlns:mc="http://schemas.openxmlformats.org/markup-compatibility/2006">
+        <mc:Choice xmlns:a14="http://schemas.microsoft.com/office/drawing/2010/main" Requires="a14">
+          <p:sp>
+            <p:nvSpPr>
+              <p:cNvPr id="3" name="Content Placeholder 2"/>
+              <p:cNvSpPr>
+                <a:spLocks noGrp="1"/>
+              </p:cNvSpPr>
+              <p:nvPr>
+                <p:ph idx="1"/>
+              </p:nvPr>
+            </p:nvSpPr>
+            <p:spPr/>
+            <p:txBody>
+              <a:bodyPr/>
+              <a:lstStyle/>
+              <a:p>
+                <a:r>
+                  <a:rPr lang="en-GB" dirty="0" smtClean="0">
+                    <a:latin typeface="Times New Roman" charset="0"/>
+                    <a:ea typeface="Times New Roman" charset="0"/>
+                    <a:cs typeface="Times New Roman" charset="0"/>
+                  </a:rPr>
+                  <a:t>Uncertainties in data sets</a:t>
+                </a:r>
+              </a:p>
+              <a:p>
+                <a:r>
+                  <a:rPr lang="en-GB" dirty="0" smtClean="0">
+                    <a:latin typeface="Times New Roman" charset="0"/>
+                    <a:ea typeface="Times New Roman" charset="0"/>
+                    <a:cs typeface="Times New Roman" charset="0"/>
+                  </a:rPr>
+                  <a:t>Larger data sets of </a:t>
+                </a:r>
+                <a:r>
+                  <a:rPr lang="en-GB" dirty="0" err="1" smtClean="0">
+                    <a:latin typeface="Times New Roman" charset="0"/>
+                    <a:ea typeface="Times New Roman" charset="0"/>
+                    <a:cs typeface="Times New Roman" charset="0"/>
+                  </a:rPr>
+                  <a:t>SNe</a:t>
+                </a:r>
+                <a:r>
+                  <a:rPr lang="en-GB" dirty="0" smtClean="0">
+                    <a:latin typeface="Times New Roman" charset="0"/>
+                    <a:ea typeface="Times New Roman" charset="0"/>
+                    <a:cs typeface="Times New Roman" charset="0"/>
+                  </a:rPr>
+                  <a:t> </a:t>
+                </a:r>
+                <a:r>
+                  <a:rPr lang="mr-IN" dirty="0" smtClean="0">
+                    <a:latin typeface="Times New Roman" charset="0"/>
+                    <a:ea typeface="Times New Roman" charset="0"/>
+                    <a:cs typeface="Times New Roman" charset="0"/>
+                  </a:rPr>
+                  <a:t>–</a:t>
+                </a:r>
+                <a:r>
+                  <a:rPr lang="en-GB" dirty="0" smtClean="0">
+                    <a:latin typeface="Times New Roman" charset="0"/>
+                    <a:ea typeface="Times New Roman" charset="0"/>
+                    <a:cs typeface="Times New Roman" charset="0"/>
+                  </a:rPr>
+                  <a:t> investigating the uncertainties on </a:t>
+                </a:r>
+                <a14:m>
+                  <m:oMath xmlns:m="http://schemas.openxmlformats.org/officeDocument/2006/math">
+                    <m:sSub>
+                      <m:sSubPr>
+                        <m:ctrlPr>
+                          <a:rPr lang="en-US" i="1" smtClean="0">
+                            <a:latin typeface="Cambria Math" charset="0"/>
+                            <a:ea typeface="Cambria Math" charset="0"/>
+                            <a:cs typeface="Cambria Math" charset="0"/>
+                          </a:rPr>
+                        </m:ctrlPr>
+                      </m:sSubPr>
+                      <m:e>
+                        <m:r>
+                          <m:rPr>
+                            <m:sty m:val="p"/>
+                          </m:rPr>
+                          <a:rPr lang="el-GR" i="1" smtClean="0">
+                            <a:latin typeface="Cambria Math" charset="0"/>
+                            <a:ea typeface="Cambria Math" charset="0"/>
+                            <a:cs typeface="Cambria Math" charset="0"/>
+                          </a:rPr>
+                          <m:t>Ω</m:t>
+                        </m:r>
+                      </m:e>
+                      <m:sub>
+                        <m:r>
+                          <m:rPr>
+                            <m:sty m:val="p"/>
+                          </m:rPr>
+                          <a:rPr lang="el-GR" i="1" smtClean="0">
+                            <a:latin typeface="Cambria Math" charset="0"/>
+                            <a:ea typeface="Cambria Math" charset="0"/>
+                            <a:cs typeface="Cambria Math" charset="0"/>
+                          </a:rPr>
+                          <m:t>Λ</m:t>
+                        </m:r>
+                      </m:sub>
+                    </m:sSub>
+                  </m:oMath>
+                </a14:m>
+                <a:endParaRPr lang="en-GB" dirty="0" smtClean="0">
+                  <a:latin typeface="Times New Roman" charset="0"/>
+                  <a:ea typeface="Times New Roman" charset="0"/>
+                  <a:cs typeface="Times New Roman" charset="0"/>
+                </a:endParaRPr>
+              </a:p>
+              <a:p>
+                <a:r>
+                  <a:rPr lang="en-GB" dirty="0" smtClean="0">
+                    <a:latin typeface="Times New Roman" charset="0"/>
+                    <a:ea typeface="Times New Roman" charset="0"/>
+                    <a:cs typeface="Times New Roman" charset="0"/>
+                  </a:rPr>
+                  <a:t>Obtaining another measure for the quality of fit for the data to models</a:t>
+                </a:r>
+                <a:endParaRPr lang="en-GB" dirty="0" smtClean="0">
+                  <a:latin typeface="Times New Roman" charset="0"/>
+                  <a:ea typeface="Times New Roman" charset="0"/>
+                  <a:cs typeface="Times New Roman" charset="0"/>
+                </a:endParaRPr>
+              </a:p>
+            </p:txBody>
+          </p:sp>
+        </mc:Choice>
+        <mc:Fallback>
+          <p:sp>
+            <p:nvSpPr>
+              <p:cNvPr id="3" name="Content Placeholder 2"/>
+              <p:cNvSpPr>
+                <a:spLocks noGrp="1" noRot="1" noChangeAspect="1" noMove="1" noResize="1" noEditPoints="1" noAdjustHandles="1" noChangeArrowheads="1" noChangeShapeType="1" noTextEdit="1"/>
+              </p:cNvSpPr>
+              <p:nvPr>
+                <p:ph idx="1"/>
+              </p:nvPr>
+            </p:nvSpPr>
+            <p:spPr>
+              <a:blipFill rotWithShape="0">
+                <a:blip r:embed="rId3"/>
+                <a:stretch>
+                  <a:fillRect l="-1043" t="-2381"/>
+                </a:stretch>
+              </a:blipFill>
+            </p:spPr>
+            <p:txBody>
+              <a:bodyPr/>
+              <a:lstStyle/>
+              <a:p>
+                <a:r>
+                  <a:rPr lang="en-GB">
+                    <a:noFill/>
+                  </a:rPr>
+                  <a:t> </a:t>
+                </a:r>
+              </a:p>
+            </p:txBody>
+          </p:sp>
+        </mc:Fallback>
+      </mc:AlternateContent>
       <p:sp>
         <p:nvSpPr>
           <p:cNvPr id="4" name="TextBox 3"/>
@@ -4475,44 +5780,20 @@
           <a:lstStyle/>
           <a:p>
             <a:r>
-              <a:rPr lang="en-US" sz="1600" dirty="0">
-                <a:latin typeface="Times New Roman" charset="0"/>
-                <a:ea typeface="Times New Roman" charset="0"/>
-                <a:cs typeface="Times New Roman" charset="0"/>
-              </a:rPr>
-              <a:t>S. E. </a:t>
-            </a:r>
-            <a:r>
-              <a:rPr lang="en-US" sz="1600" dirty="0" err="1">
-                <a:latin typeface="Times New Roman" charset="0"/>
-                <a:ea typeface="Times New Roman" charset="0"/>
-                <a:cs typeface="Times New Roman" charset="0"/>
-              </a:rPr>
-              <a:t>Woosley</a:t>
-            </a:r>
-            <a:r>
-              <a:rPr lang="en-US" sz="1600" dirty="0">
-                <a:latin typeface="Times New Roman" charset="0"/>
-                <a:ea typeface="Times New Roman" charset="0"/>
-                <a:cs typeface="Times New Roman" charset="0"/>
-              </a:rPr>
-              <a:t> and T. A. Weaver. The Physics of </a:t>
-            </a:r>
-            <a:r>
               <a:rPr lang="en-US" sz="1600" dirty="0" smtClean="0">
                 <a:latin typeface="Times New Roman" charset="0"/>
                 <a:ea typeface="Times New Roman" charset="0"/>
                 <a:cs typeface="Times New Roman" charset="0"/>
               </a:rPr>
-              <a:t>Supernova </a:t>
-            </a:r>
-            <a:r>
-              <a:rPr lang="en-US" sz="1600" dirty="0">
-                <a:latin typeface="Times New Roman" charset="0"/>
-                <a:ea typeface="Times New Roman" charset="0"/>
-                <a:cs typeface="Times New Roman" charset="0"/>
-              </a:rPr>
-              <a:t>Explosions. Annual Review of Astronomy and </a:t>
+              <a:t>T. A. </a:t>
+            </a:r>
+            <a:r>
+              <a:rPr lang="en-US" sz="1600" dirty="0" err="1" smtClean="0">
+                <a:latin typeface="Times New Roman" charset="0"/>
+                <a:ea typeface="Times New Roman" charset="0"/>
+                <a:cs typeface="Times New Roman" charset="0"/>
+              </a:rPr>
+              <a:t>Ottosen</a:t>
             </a:r>
             <a:r>
               <a:rPr lang="en-US" sz="1600" dirty="0" smtClean="0">
@@ -4520,15 +5801,23 @@
                 <a:ea typeface="Times New Roman" charset="0"/>
                 <a:cs typeface="Times New Roman" charset="0"/>
               </a:rPr>
-              <a:t>Astrophysics</a:t>
-            </a:r>
-            <a:r>
-              <a:rPr lang="en-US" sz="1600" dirty="0">
-                <a:latin typeface="Times New Roman" charset="0"/>
-                <a:ea typeface="Times New Roman" charset="0"/>
-                <a:cs typeface="Times New Roman" charset="0"/>
-              </a:rPr>
-              <a:t>, 24:205–253, 1986. </a:t>
+              <a:t>. A Bayesian Approach to Statistical Mechanics. </a:t>
+            </a:r>
+            <a:r>
+              <a:rPr lang="en-US" sz="1600" dirty="0" err="1" smtClean="0">
+                <a:latin typeface="Times New Roman" charset="0"/>
+                <a:ea typeface="Times New Roman" charset="0"/>
+                <a:cs typeface="Times New Roman" charset="0"/>
+              </a:rPr>
+              <a:t>arXiv</a:t>
+            </a:r>
+            <a:r>
+              <a:rPr lang="en-US" sz="1600" dirty="0" smtClean="0">
+                <a:latin typeface="Times New Roman" charset="0"/>
+                <a:ea typeface="Times New Roman" charset="0"/>
+                <a:cs typeface="Times New Roman" charset="0"/>
+              </a:rPr>
+              <a:t>, 2012. </a:t>
             </a:r>
             <a:endParaRPr lang="en-US" sz="1600" dirty="0">
               <a:latin typeface="Times New Roman" charset="0"/>
@@ -4555,6 +5844,13 @@
   <p:clrMapOvr>
     <a:masterClrMapping/>
   </p:clrMapOvr>
+  <p:timing>
+    <p:tnLst>
+      <p:par>
+        <p:cTn id="1" dur="indefinite" restart="never" nodeType="tmRoot"/>
+      </p:par>
+    </p:tnLst>
+  </p:timing>
 </p:sld>
 </file>
 
@@ -4627,10 +5923,48 @@
                 <a:ea typeface="Times New Roman" charset="0"/>
                 <a:cs typeface="Times New Roman" charset="0"/>
               </a:rPr>
-              <a:t>Larger data sets</a:t>
-            </a:r>
-          </a:p>
-          <a:p>
+              <a:t>Type </a:t>
+            </a:r>
+            <a:r>
+              <a:rPr lang="en-GB" dirty="0" err="1" smtClean="0">
+                <a:latin typeface="Times New Roman" charset="0"/>
+                <a:ea typeface="Times New Roman" charset="0"/>
+                <a:cs typeface="Times New Roman" charset="0"/>
+              </a:rPr>
+              <a:t>Ia</a:t>
+            </a:r>
+            <a:r>
+              <a:rPr lang="en-GB" dirty="0" smtClean="0">
+                <a:latin typeface="Times New Roman" charset="0"/>
+                <a:ea typeface="Times New Roman" charset="0"/>
+                <a:cs typeface="Times New Roman" charset="0"/>
+              </a:rPr>
+              <a:t> Supernova Explosions as Standard Candles</a:t>
+            </a:r>
+          </a:p>
+          <a:p>
+            <a:r>
+              <a:rPr lang="en-GB" dirty="0" smtClean="0">
+                <a:latin typeface="Times New Roman" charset="0"/>
+                <a:ea typeface="Times New Roman" charset="0"/>
+                <a:cs typeface="Times New Roman" charset="0"/>
+              </a:rPr>
+              <a:t>Constraining cosmological parameters </a:t>
+            </a:r>
+          </a:p>
+          <a:p>
+            <a:pPr lvl="1"/>
+            <a:r>
+              <a:rPr lang="en-GB" dirty="0" smtClean="0">
+                <a:latin typeface="Times New Roman" charset="0"/>
+                <a:ea typeface="Times New Roman" charset="0"/>
+                <a:cs typeface="Times New Roman" charset="0"/>
+              </a:rPr>
+              <a:t>Using larger data sets</a:t>
+            </a:r>
+          </a:p>
+          <a:p>
+            <a:pPr lvl="1"/>
             <a:r>
               <a:rPr lang="en-GB" dirty="0" smtClean="0">
                 <a:latin typeface="Times New Roman" charset="0"/>
@@ -4750,6 +6084,13 @@
   <p:clrMapOvr>
     <a:masterClrMapping/>
   </p:clrMapOvr>
+  <p:timing>
+    <p:tnLst>
+      <p:par>
+        <p:cTn id="1" dur="indefinite" restart="never" nodeType="tmRoot"/>
+      </p:par>
+    </p:tnLst>
+  </p:timing>
 </p:sld>
 </file>
 

</xml_diff>

<commit_message>
generally done with it
bleugh
</commit_message>
<xml_diff>
--- a/physics_problem_solving/supernova_cosmology_jacky_cao.pptx
+++ b/physics_problem_solving/supernova_cosmology_jacky_cao.pptx
@@ -858,7 +858,7 @@
             </a:pPr>
             <a:r>
               <a:rPr lang="en-GB" baseline="0" dirty="0" smtClean="0"/>
-              <a:t>Type IIP has a plateau in it’s light curve</a:t>
+              <a:t>Type IIP has a plateau in it’s light curve after it’s peak</a:t>
             </a:r>
           </a:p>
           <a:p>
@@ -868,7 +868,7 @@
             </a:pPr>
             <a:r>
               <a:rPr lang="en-GB" baseline="0" dirty="0" smtClean="0"/>
-              <a:t>Type IIL has a line in it’s light curve</a:t>
+              <a:t>Type IIL has a line in it’s light curve as it trails off after peak</a:t>
             </a:r>
           </a:p>
           <a:p>
@@ -1529,7 +1529,7 @@
                 </a:pPr>
                 <a:r>
                   <a:rPr lang="en-GB" baseline="0" dirty="0" smtClean="0"/>
-                  <a:t>We have a dataset D, and we can calculate the probability of the dataset given the values of the parameters of our model. We can then find a distribution function. </a:t>
+                  <a:t>We have a dataset, and we can calculate the probability of the dataset given the values of the parameters of our model, then from this we can then find a distribution function. </a:t>
                 </a:r>
               </a:p>
               <a:p>
@@ -1543,6 +1543,32 @@
                 </a:r>
               </a:p>
               <a:p>
+                <a:pPr marL="628650" lvl="1" indent="-171450">
+                  <a:buFontTx/>
+                  <a:buChar char="-"/>
+                </a:pPr>
+                <a:r>
+                  <a:rPr lang="en-GB" baseline="0" dirty="0" smtClean="0"/>
+                  <a:t>MCMC uses the principle of random walks to sample the data </a:t>
+                </a:r>
+                <a:r>
+                  <a:rPr lang="mr-IN" baseline="0" dirty="0" smtClean="0"/>
+                  <a:t>–</a:t>
+                </a:r>
+                <a:r>
+                  <a:rPr lang="en-GB" baseline="0" dirty="0" smtClean="0"/>
+                  <a:t> state of the chain after a number of steps is then used as a sample of the desired distribution </a:t>
+                </a:r>
+                <a:r>
+                  <a:rPr lang="mr-IN" baseline="0" dirty="0" smtClean="0"/>
+                  <a:t>–</a:t>
+                </a:r>
+                <a:r>
+                  <a:rPr lang="en-GB" baseline="0" dirty="0" smtClean="0"/>
+                  <a:t> quality of sample improves as a function of the number of steps</a:t>
+                </a:r>
+              </a:p>
+              <a:p>
                 <a:pPr marL="171450" lvl="0" indent="-171450">
                   <a:buFontTx/>
                   <a:buChar char="-"/>
@@ -1550,6 +1576,16 @@
                 <a:r>
                   <a:rPr lang="en-GB" baseline="0" dirty="0" smtClean="0"/>
                   <a:t>Exploring Bayesian statistics, we find a result from Bayes’ theorem that data changes probability </a:t>
+                </a:r>
+              </a:p>
+              <a:p>
+                <a:pPr marL="171450" lvl="0" indent="-171450">
+                  <a:buFontTx/>
+                  <a:buChar char="-"/>
+                </a:pPr>
+                <a:r>
+                  <a:rPr lang="en-GB" baseline="0" dirty="0" smtClean="0"/>
+                  <a:t>We want to improve our best fit parameters and using the MCMC method will allow us to do that</a:t>
                 </a:r>
               </a:p>
             </p:txBody>
@@ -1730,7 +1766,7 @@
                 </a:pPr>
                 <a:r>
                   <a:rPr lang="en-GB" baseline="0" dirty="0" smtClean="0"/>
-                  <a:t>We have a dataset D, and we can calculate the probability of the dataset given the values of the parameters of our model. We can then find a distribution function. </a:t>
+                  <a:t>We have a dataset, and we can calculate the probability of the dataset given the values of the parameters of our model, then from this we can then find a distribution function. </a:t>
                 </a:r>
               </a:p>
               <a:p>
@@ -1744,6 +1780,32 @@
                 </a:r>
               </a:p>
               <a:p>
+                <a:pPr marL="628650" lvl="1" indent="-171450">
+                  <a:buFontTx/>
+                  <a:buChar char="-"/>
+                </a:pPr>
+                <a:r>
+                  <a:rPr lang="en-GB" baseline="0" dirty="0" smtClean="0"/>
+                  <a:t>MCMC uses the principle of random walks to sample the data </a:t>
+                </a:r>
+                <a:r>
+                  <a:rPr lang="mr-IN" baseline="0" dirty="0" smtClean="0"/>
+                  <a:t>–</a:t>
+                </a:r>
+                <a:r>
+                  <a:rPr lang="en-GB" baseline="0" dirty="0" smtClean="0"/>
+                  <a:t> state of the chain after a number of steps is then used as a sample of the desired distribution </a:t>
+                </a:r>
+                <a:r>
+                  <a:rPr lang="mr-IN" baseline="0" dirty="0" smtClean="0"/>
+                  <a:t>–</a:t>
+                </a:r>
+                <a:r>
+                  <a:rPr lang="en-GB" baseline="0" dirty="0" smtClean="0"/>
+                  <a:t> quality of sample improves as a function of the number of steps</a:t>
+                </a:r>
+              </a:p>
+              <a:p>
                 <a:pPr marL="171450" lvl="0" indent="-171450">
                   <a:buFontTx/>
                   <a:buChar char="-"/>
@@ -1751,6 +1813,16 @@
                 <a:r>
                   <a:rPr lang="en-GB" baseline="0" dirty="0" smtClean="0"/>
                   <a:t>Exploring Bayesian statistics, we find a result from Bayes’ theorem that data changes probability </a:t>
+                </a:r>
+              </a:p>
+              <a:p>
+                <a:pPr marL="171450" lvl="0" indent="-171450">
+                  <a:buFontTx/>
+                  <a:buChar char="-"/>
+                </a:pPr>
+                <a:r>
+                  <a:rPr lang="en-GB" baseline="0" dirty="0" smtClean="0"/>
+                  <a:t>We want to improve our best fit parameters and using the MCMC method will allow us to do that</a:t>
                 </a:r>
               </a:p>
             </p:txBody>
@@ -1784,6 +1856,401 @@
     <p:extLst>
       <p:ext uri="{BB962C8B-B14F-4D97-AF65-F5344CB8AC3E}">
         <p14:creationId xmlns:p14="http://schemas.microsoft.com/office/powerpoint/2010/main" val="1898143971"/>
+      </p:ext>
+    </p:extLst>
+  </p:cSld>
+  <p:clrMapOvr>
+    <a:masterClrMapping/>
+  </p:clrMapOvr>
+</p:notes>
+</file>
+
+<file path=ppt/notesSlides/notesSlide6.xml><?xml version="1.0" encoding="utf-8"?>
+<p:notes xmlns:a="http://schemas.openxmlformats.org/drawingml/2006/main" xmlns:r="http://schemas.openxmlformats.org/officeDocument/2006/relationships" xmlns:p="http://schemas.openxmlformats.org/presentationml/2006/main">
+  <p:cSld>
+    <p:spTree>
+      <p:nvGrpSpPr>
+        <p:cNvPr id="1" name=""/>
+        <p:cNvGrpSpPr/>
+        <p:nvPr/>
+      </p:nvGrpSpPr>
+      <p:grpSpPr>
+        <a:xfrm>
+          <a:off x="0" y="0"/>
+          <a:ext cx="0" cy="0"/>
+          <a:chOff x="0" y="0"/>
+          <a:chExt cx="0" cy="0"/>
+        </a:xfrm>
+      </p:grpSpPr>
+      <p:sp>
+        <p:nvSpPr>
+          <p:cNvPr id="2" name="Slide Image Placeholder 1"/>
+          <p:cNvSpPr>
+            <a:spLocks noGrp="1" noRot="1" noChangeAspect="1"/>
+          </p:cNvSpPr>
+          <p:nvPr>
+            <p:ph type="sldImg"/>
+          </p:nvPr>
+        </p:nvSpPr>
+        <p:spPr/>
+      </p:sp>
+      <mc:AlternateContent xmlns:mc="http://schemas.openxmlformats.org/markup-compatibility/2006">
+        <mc:Choice xmlns:a14="http://schemas.microsoft.com/office/drawing/2010/main" Requires="a14">
+          <p:sp>
+            <p:nvSpPr>
+              <p:cNvPr id="3" name="Notes Placeholder 2"/>
+              <p:cNvSpPr>
+                <a:spLocks noGrp="1"/>
+              </p:cNvSpPr>
+              <p:nvPr>
+                <p:ph type="body" idx="1"/>
+              </p:nvPr>
+            </p:nvSpPr>
+            <p:spPr/>
+            <p:txBody>
+              <a:bodyPr/>
+              <a:lstStyle/>
+              <a:p>
+                <a:pPr marL="171450" indent="-171450">
+                  <a:buFontTx/>
+                  <a:buChar char="-"/>
+                </a:pPr>
+                <a:r>
+                  <a:rPr lang="en-GB" dirty="0" smtClean="0"/>
+                  <a:t>Using Type</a:t>
+                </a:r>
+                <a:r>
+                  <a:rPr lang="en-GB" baseline="0" dirty="0" smtClean="0"/>
+                  <a:t> </a:t>
+                </a:r>
+                <a:r>
+                  <a:rPr lang="en-GB" baseline="0" dirty="0" err="1" smtClean="0"/>
+                  <a:t>Ia</a:t>
+                </a:r>
+                <a:r>
+                  <a:rPr lang="en-GB" baseline="0" dirty="0" smtClean="0"/>
+                  <a:t> </a:t>
+                </a:r>
+                <a:r>
+                  <a:rPr lang="en-GB" baseline="0" dirty="0" err="1" smtClean="0"/>
+                  <a:t>SNe</a:t>
+                </a:r>
+                <a:r>
+                  <a:rPr lang="en-GB" baseline="0" dirty="0" smtClean="0"/>
+                  <a:t> as standard candles allows us to collect data and then produce distance information</a:t>
+                </a:r>
+              </a:p>
+              <a:p>
+                <a:pPr marL="171450" indent="-171450">
+                  <a:buFontTx/>
+                  <a:buChar char="-"/>
+                </a:pPr>
+                <a:r>
+                  <a:rPr lang="en-GB" baseline="0" dirty="0" smtClean="0"/>
+                  <a:t>With this we can then calculate cosmological parameters using the Friedman equation as a simple model, and also using </a:t>
+                </a:r>
+                <a14:m>
+                  <m:oMath xmlns:m="http://schemas.openxmlformats.org/officeDocument/2006/math">
+                    <m:sSup>
+                      <m:sSupPr>
+                        <m:ctrlPr>
+                          <a:rPr lang="en-GB" i="1" baseline="0" smtClean="0">
+                            <a:latin typeface="Cambria Math" charset="0"/>
+                          </a:rPr>
+                        </m:ctrlPr>
+                      </m:sSupPr>
+                      <m:e>
+                        <m:r>
+                          <a:rPr lang="en-GB" i="1" baseline="0" smtClean="0">
+                            <a:latin typeface="Cambria Math" charset="0"/>
+                            <a:ea typeface="Cambria Math" charset="0"/>
+                            <a:cs typeface="Cambria Math" charset="0"/>
+                          </a:rPr>
+                          <m:t>𝜒</m:t>
+                        </m:r>
+                      </m:e>
+                      <m:sup>
+                        <m:r>
+                          <a:rPr lang="en-GB" b="0" i="1" baseline="0" smtClean="0">
+                            <a:latin typeface="Cambria Math" charset="0"/>
+                          </a:rPr>
+                          <m:t>2</m:t>
+                        </m:r>
+                      </m:sup>
+                    </m:sSup>
+                  </m:oMath>
+                </a14:m>
+                <a:r>
+                  <a:rPr lang="en-GB" baseline="0" dirty="0" smtClean="0"/>
+                  <a:t> </a:t>
+                </a:r>
+                <a:r>
+                  <a:rPr lang="en-GB" baseline="0" dirty="0" smtClean="0"/>
+                  <a:t>method/tests</a:t>
+                </a:r>
+              </a:p>
+              <a:p>
+                <a:pPr marL="171450" indent="-171450">
+                  <a:buFontTx/>
+                  <a:buChar char="-"/>
+                </a:pPr>
+                <a:r>
+                  <a:rPr lang="en-GB" baseline="0" dirty="0" smtClean="0"/>
+                  <a:t>Through using larger data sets we can constrain what parameters are affecting what </a:t>
+                </a:r>
+                <a:r>
+                  <a:rPr lang="mr-IN" baseline="0" dirty="0" smtClean="0"/>
+                  <a:t>–</a:t>
+                </a:r>
+                <a:r>
+                  <a:rPr lang="en-GB" baseline="0" dirty="0" smtClean="0"/>
+                  <a:t> separate into SN type, galaxy types. It is important how the uncertainties are being affected as we want to be as accurate as possible! </a:t>
+                </a:r>
+              </a:p>
+              <a:p>
+                <a:pPr marL="171450" indent="-171450">
+                  <a:buFontTx/>
+                  <a:buChar char="-"/>
+                </a:pPr>
+                <a:r>
+                  <a:rPr lang="en-GB" baseline="0" dirty="0" smtClean="0"/>
+                  <a:t>Then we can try and obtain another measure for the quality of fit for the data to the model as opposed to the </a:t>
+                </a:r>
+                <a14:m>
+                  <m:oMath xmlns:m="http://schemas.openxmlformats.org/officeDocument/2006/math">
+                    <m:sSup>
+                      <m:sSupPr>
+                        <m:ctrlPr>
+                          <a:rPr lang="en-GB" i="1" baseline="0" smtClean="0">
+                            <a:latin typeface="Cambria Math" charset="0"/>
+                          </a:rPr>
+                        </m:ctrlPr>
+                      </m:sSupPr>
+                      <m:e>
+                        <m:r>
+                          <a:rPr lang="en-GB" i="1" baseline="0" smtClean="0">
+                            <a:latin typeface="Cambria Math" charset="0"/>
+                            <a:ea typeface="Cambria Math" charset="0"/>
+                            <a:cs typeface="Cambria Math" charset="0"/>
+                          </a:rPr>
+                          <m:t>𝜒</m:t>
+                        </m:r>
+                      </m:e>
+                      <m:sup>
+                        <m:r>
+                          <a:rPr lang="en-GB" b="0" i="1" baseline="0" smtClean="0">
+                            <a:latin typeface="Cambria Math" charset="0"/>
+                          </a:rPr>
+                          <m:t>2</m:t>
+                        </m:r>
+                      </m:sup>
+                    </m:sSup>
+                  </m:oMath>
+                </a14:m>
+                <a:r>
+                  <a:rPr lang="en-GB" dirty="0" smtClean="0"/>
+                  <a:t> approach </a:t>
+                </a:r>
+                <a:r>
+                  <a:rPr lang="mr-IN" dirty="0" smtClean="0"/>
+                  <a:t>–</a:t>
+                </a:r>
+                <a:r>
+                  <a:rPr lang="en-GB" dirty="0" smtClean="0"/>
+                  <a:t> MCMC approach</a:t>
+                </a:r>
+                <a:r>
+                  <a:rPr lang="en-GB" baseline="0" dirty="0" smtClean="0"/>
+                  <a:t> will allow us to sample the parameter space with a probability that depends on the likelihood that the model is a good fit to the data</a:t>
+                </a:r>
+                <a:endParaRPr lang="en-GB" dirty="0"/>
+              </a:p>
+            </p:txBody>
+          </p:sp>
+        </mc:Choice>
+        <mc:Fallback>
+          <p:sp>
+            <p:nvSpPr>
+              <p:cNvPr id="3" name="Notes Placeholder 2"/>
+              <p:cNvSpPr>
+                <a:spLocks noGrp="1"/>
+              </p:cNvSpPr>
+              <p:nvPr>
+                <p:ph type="body" idx="1"/>
+              </p:nvPr>
+            </p:nvSpPr>
+            <p:spPr/>
+            <p:txBody>
+              <a:bodyPr/>
+              <a:lstStyle/>
+              <a:p>
+                <a:pPr marL="171450" indent="-171450">
+                  <a:buFontTx/>
+                  <a:buChar char="-"/>
+                </a:pPr>
+                <a:r>
+                  <a:rPr lang="en-GB" dirty="0" smtClean="0"/>
+                  <a:t>Using Type</a:t>
+                </a:r>
+                <a:r>
+                  <a:rPr lang="en-GB" baseline="0" dirty="0" smtClean="0"/>
+                  <a:t> </a:t>
+                </a:r>
+                <a:r>
+                  <a:rPr lang="en-GB" baseline="0" dirty="0" err="1" smtClean="0"/>
+                  <a:t>Ia</a:t>
+                </a:r>
+                <a:r>
+                  <a:rPr lang="en-GB" baseline="0" dirty="0" smtClean="0"/>
+                  <a:t> </a:t>
+                </a:r>
+                <a:r>
+                  <a:rPr lang="en-GB" baseline="0" dirty="0" err="1" smtClean="0"/>
+                  <a:t>SNe</a:t>
+                </a:r>
+                <a:r>
+                  <a:rPr lang="en-GB" baseline="0" dirty="0" smtClean="0"/>
+                  <a:t> as standard candles allows us to collect data and then produce distance information</a:t>
+                </a:r>
+              </a:p>
+              <a:p>
+                <a:pPr marL="171450" indent="-171450">
+                  <a:buFontTx/>
+                  <a:buChar char="-"/>
+                </a:pPr>
+                <a:r>
+                  <a:rPr lang="en-GB" baseline="0" dirty="0" smtClean="0"/>
+                  <a:t>With this we can then calculate cosmological parameters using the Friedman equation as a simple model, and also using </a:t>
+                </a:r>
+                <a:r>
+                  <a:rPr lang="en-GB" i="0" baseline="0" smtClean="0">
+                    <a:latin typeface="Cambria Math" charset="0"/>
+                    <a:ea typeface="Cambria Math" charset="0"/>
+                    <a:cs typeface="Cambria Math" charset="0"/>
+                  </a:rPr>
+                  <a:t>𝜒</a:t>
+                </a:r>
+                <a:r>
+                  <a:rPr lang="en-GB" i="0" baseline="0" smtClean="0">
+                    <a:latin typeface="Cambria Math" charset="0"/>
+                    <a:ea typeface="Cambria Math" charset="0"/>
+                    <a:cs typeface="Cambria Math" charset="0"/>
+                  </a:rPr>
+                  <a:t>^</a:t>
+                </a:r>
+                <a:r>
+                  <a:rPr lang="en-GB" b="0" i="0" baseline="0" smtClean="0">
+                    <a:latin typeface="Cambria Math" charset="0"/>
+                  </a:rPr>
+                  <a:t>2</a:t>
+                </a:r>
+                <a:r>
+                  <a:rPr lang="en-GB" baseline="0" dirty="0" smtClean="0"/>
+                  <a:t> </a:t>
+                </a:r>
+                <a:r>
+                  <a:rPr lang="en-GB" baseline="0" dirty="0" smtClean="0"/>
+                  <a:t>method/tests</a:t>
+                </a:r>
+              </a:p>
+              <a:p>
+                <a:pPr marL="171450" indent="-171450">
+                  <a:buFontTx/>
+                  <a:buChar char="-"/>
+                </a:pPr>
+                <a:r>
+                  <a:rPr lang="en-GB" baseline="0" dirty="0" smtClean="0"/>
+                  <a:t>Through using larger data sets we can constrain what parameters are affecting what </a:t>
+                </a:r>
+                <a:r>
+                  <a:rPr lang="mr-IN" baseline="0" dirty="0" smtClean="0"/>
+                  <a:t>–</a:t>
+                </a:r>
+                <a:r>
+                  <a:rPr lang="en-GB" baseline="0" dirty="0" smtClean="0"/>
+                  <a:t> separate into SN type, galaxy types. It is important how the uncertainties are being affected as we want to be as accurate as possible! </a:t>
+                </a:r>
+              </a:p>
+              <a:p>
+                <a:pPr marL="171450" indent="-171450">
+                  <a:buFontTx/>
+                  <a:buChar char="-"/>
+                </a:pPr>
+                <a:r>
+                  <a:rPr lang="en-GB" baseline="0" dirty="0" smtClean="0"/>
+                  <a:t>Then we can try and obtain another measure for the quality of fit for the data to the model as opposed to the </a:t>
+                </a:r>
+                <a:r>
+                  <a:rPr lang="en-GB" i="0" baseline="0" smtClean="0">
+                    <a:latin typeface="Cambria Math" charset="0"/>
+                    <a:ea typeface="Cambria Math" charset="0"/>
+                    <a:cs typeface="Cambria Math" charset="0"/>
+                  </a:rPr>
+                  <a:t>𝜒</a:t>
+                </a:r>
+                <a:r>
+                  <a:rPr lang="en-GB" i="0" baseline="0" smtClean="0">
+                    <a:latin typeface="Cambria Math" charset="0"/>
+                    <a:ea typeface="Cambria Math" charset="0"/>
+                    <a:cs typeface="Cambria Math" charset="0"/>
+                  </a:rPr>
+                  <a:t>^</a:t>
+                </a:r>
+                <a:r>
+                  <a:rPr lang="en-GB" b="0" i="0" baseline="0" smtClean="0">
+                    <a:latin typeface="Cambria Math" charset="0"/>
+                  </a:rPr>
+                  <a:t>2</a:t>
+                </a:r>
+                <a:r>
+                  <a:rPr lang="en-GB" dirty="0" smtClean="0"/>
+                  <a:t> approach </a:t>
+                </a:r>
+                <a:r>
+                  <a:rPr lang="mr-IN" dirty="0" smtClean="0"/>
+                  <a:t>–</a:t>
+                </a:r>
+                <a:r>
+                  <a:rPr lang="en-GB" dirty="0" smtClean="0"/>
+                  <a:t> MCMC approach</a:t>
+                </a:r>
+                <a:r>
+                  <a:rPr lang="en-GB" baseline="0" dirty="0" smtClean="0"/>
+                  <a:t> will allow us to sample the parameter space with a probability that depends on the likelihood that the model is a good fit to the data</a:t>
+                </a:r>
+                <a:endParaRPr lang="en-GB" dirty="0"/>
+              </a:p>
+            </p:txBody>
+          </p:sp>
+        </mc:Fallback>
+      </mc:AlternateContent>
+      <p:sp>
+        <p:nvSpPr>
+          <p:cNvPr id="4" name="Slide Number Placeholder 3"/>
+          <p:cNvSpPr>
+            <a:spLocks noGrp="1"/>
+          </p:cNvSpPr>
+          <p:nvPr>
+            <p:ph type="sldNum" sz="quarter" idx="10"/>
+          </p:nvPr>
+        </p:nvSpPr>
+        <p:spPr/>
+        <p:txBody>
+          <a:bodyPr/>
+          <a:lstStyle/>
+          <a:p>
+            <a:fld id="{6CAB2768-F516-4545-BFD7-27EF3C6F6EB8}" type="slidenum">
+              <a:rPr lang="en-GB" smtClean="0"/>
+              <a:t>6</a:t>
+            </a:fld>
+            <a:endParaRPr lang="en-GB"/>
+          </a:p>
+        </p:txBody>
+      </p:sp>
+    </p:spTree>
+    <p:extLst>
+      <p:ext uri="{BB962C8B-B14F-4D97-AF65-F5344CB8AC3E}">
+        <p14:creationId xmlns:p14="http://schemas.microsoft.com/office/powerpoint/2010/main" val="1297781198"/>
       </p:ext>
     </p:extLst>
   </p:cSld>
@@ -5296,8 +5763,36 @@
                 <a:ea typeface="Times New Roman" charset="0"/>
                 <a:cs typeface="Times New Roman" charset="0"/>
               </a:rPr>
-              <a:t>add the equation in?</a:t>
-            </a:r>
+              <a:t>add the equation in? or add a reference where </a:t>
+            </a:r>
+            <a:r>
+              <a:rPr lang="en-GB">
+                <a:latin typeface="Times New Roman" charset="0"/>
+                <a:ea typeface="Times New Roman" charset="0"/>
+                <a:cs typeface="Times New Roman" charset="0"/>
+              </a:rPr>
+              <a:t/>
+            </a:r>
+            <a:br>
+              <a:rPr lang="en-GB">
+                <a:latin typeface="Times New Roman" charset="0"/>
+                <a:ea typeface="Times New Roman" charset="0"/>
+                <a:cs typeface="Times New Roman" charset="0"/>
+              </a:rPr>
+            </a:br>
+            <a:r>
+              <a:rPr lang="en-GB" smtClean="0">
+                <a:latin typeface="Times New Roman" charset="0"/>
+                <a:ea typeface="Times New Roman" charset="0"/>
+                <a:cs typeface="Times New Roman" charset="0"/>
+              </a:rPr>
+              <a:t>people could find it</a:t>
+            </a:r>
+            <a:endParaRPr lang="en-GB" dirty="0">
+              <a:latin typeface="Times New Roman" charset="0"/>
+              <a:ea typeface="Times New Roman" charset="0"/>
+              <a:cs typeface="Times New Roman" charset="0"/>
+            </a:endParaRPr>
           </a:p>
         </p:txBody>
       </p:sp>
@@ -5977,99 +6472,6 @@
               <a:latin typeface="Times New Roman" charset="0"/>
               <a:ea typeface="Times New Roman" charset="0"/>
               <a:cs typeface="Times New Roman" charset="0"/>
-            </a:endParaRPr>
-          </a:p>
-        </p:txBody>
-      </p:sp>
-      <p:sp>
-        <p:nvSpPr>
-          <p:cNvPr id="4" name="TextBox 3"/>
-          <p:cNvSpPr txBox="1"/>
-          <p:nvPr/>
-        </p:nvSpPr>
-        <p:spPr>
-          <a:xfrm>
-            <a:off x="282387" y="6311900"/>
-            <a:ext cx="12277165" cy="584775"/>
-          </a:xfrm>
-          <a:prstGeom prst="rect">
-            <a:avLst/>
-          </a:prstGeom>
-          <a:noFill/>
-        </p:spPr>
-        <p:txBody>
-          <a:bodyPr wrap="square" rtlCol="0">
-            <a:spAutoFit/>
-          </a:bodyPr>
-          <a:lstStyle/>
-          <a:p>
-            <a:r>
-              <a:rPr lang="en-US" sz="1600" dirty="0">
-                <a:latin typeface="Times New Roman" charset="0"/>
-                <a:ea typeface="Times New Roman" charset="0"/>
-                <a:cs typeface="Times New Roman" charset="0"/>
-              </a:rPr>
-              <a:t>S. E. </a:t>
-            </a:r>
-            <a:r>
-              <a:rPr lang="en-US" sz="1600" dirty="0" err="1">
-                <a:latin typeface="Times New Roman" charset="0"/>
-                <a:ea typeface="Times New Roman" charset="0"/>
-                <a:cs typeface="Times New Roman" charset="0"/>
-              </a:rPr>
-              <a:t>Woosley</a:t>
-            </a:r>
-            <a:r>
-              <a:rPr lang="en-US" sz="1600" dirty="0">
-                <a:latin typeface="Times New Roman" charset="0"/>
-                <a:ea typeface="Times New Roman" charset="0"/>
-                <a:cs typeface="Times New Roman" charset="0"/>
-              </a:rPr>
-              <a:t> and T. A. Weaver. The Physics of </a:t>
-            </a:r>
-            <a:r>
-              <a:rPr lang="en-US" sz="1600" dirty="0" smtClean="0">
-                <a:latin typeface="Times New Roman" charset="0"/>
-                <a:ea typeface="Times New Roman" charset="0"/>
-                <a:cs typeface="Times New Roman" charset="0"/>
-              </a:rPr>
-              <a:t>Supernova </a:t>
-            </a:r>
-            <a:r>
-              <a:rPr lang="en-US" sz="1600" dirty="0">
-                <a:latin typeface="Times New Roman" charset="0"/>
-                <a:ea typeface="Times New Roman" charset="0"/>
-                <a:cs typeface="Times New Roman" charset="0"/>
-              </a:rPr>
-              <a:t>Explosions. Annual Review of Astronomy and </a:t>
-            </a:r>
-            <a:r>
-              <a:rPr lang="en-US" sz="1600" dirty="0" smtClean="0">
-                <a:latin typeface="Times New Roman" charset="0"/>
-                <a:ea typeface="Times New Roman" charset="0"/>
-                <a:cs typeface="Times New Roman" charset="0"/>
-              </a:rPr>
-              <a:t>Astrophysics</a:t>
-            </a:r>
-            <a:r>
-              <a:rPr lang="en-US" sz="1600" dirty="0">
-                <a:latin typeface="Times New Roman" charset="0"/>
-                <a:ea typeface="Times New Roman" charset="0"/>
-                <a:cs typeface="Times New Roman" charset="0"/>
-              </a:rPr>
-              <a:t>, 24:205–253, 1986. </a:t>
-            </a:r>
-            <a:endParaRPr lang="en-US" sz="1600" dirty="0">
-              <a:latin typeface="Times New Roman" charset="0"/>
-              <a:ea typeface="Times New Roman" charset="0"/>
-              <a:cs typeface="Times New Roman" charset="0"/>
-            </a:endParaRPr>
-          </a:p>
-          <a:p>
-            <a:endParaRPr lang="en-GB" sz="1600" dirty="0">
-              <a:latin typeface="Adobe Caslon Pro" charset="0"/>
-              <a:ea typeface="Adobe Caslon Pro" charset="0"/>
-              <a:cs typeface="Adobe Caslon Pro" charset="0"/>
             </a:endParaRPr>
           </a:p>
         </p:txBody>

</xml_diff>